<commit_message>
Documented randomIn and randomOn
</commit_message>
<xml_diff>
--- a/docs/cheat-sheet.pptx
+++ b/docs/cheat-sheet.pptx
@@ -255,7 +255,7 @@
           <a:p>
             <a:fld id="{4346FDB3-09F2-4348-8F47-4013D9DCE7EC}" type="datetimeFigureOut">
               <a:rPr lang="bg-BG" smtClean="0"/>
-              <a:t>22.7.2022 г.</a:t>
+              <a:t>23.7.2022 г.</a:t>
             </a:fld>
             <a:endParaRPr lang="bg-BG"/>
           </a:p>
@@ -425,7 +425,7 @@
           <a:p>
             <a:fld id="{4346FDB3-09F2-4348-8F47-4013D9DCE7EC}" type="datetimeFigureOut">
               <a:rPr lang="bg-BG" smtClean="0"/>
-              <a:t>22.7.2022 г.</a:t>
+              <a:t>23.7.2022 г.</a:t>
             </a:fld>
             <a:endParaRPr lang="bg-BG"/>
           </a:p>
@@ -605,7 +605,7 @@
           <a:p>
             <a:fld id="{4346FDB3-09F2-4348-8F47-4013D9DCE7EC}" type="datetimeFigureOut">
               <a:rPr lang="bg-BG" smtClean="0"/>
-              <a:t>22.7.2022 г.</a:t>
+              <a:t>23.7.2022 г.</a:t>
             </a:fld>
             <a:endParaRPr lang="bg-BG"/>
           </a:p>
@@ -775,7 +775,7 @@
           <a:p>
             <a:fld id="{4346FDB3-09F2-4348-8F47-4013D9DCE7EC}" type="datetimeFigureOut">
               <a:rPr lang="bg-BG" smtClean="0"/>
-              <a:t>22.7.2022 г.</a:t>
+              <a:t>23.7.2022 г.</a:t>
             </a:fld>
             <a:endParaRPr lang="bg-BG"/>
           </a:p>
@@ -1019,7 +1019,7 @@
           <a:p>
             <a:fld id="{4346FDB3-09F2-4348-8F47-4013D9DCE7EC}" type="datetimeFigureOut">
               <a:rPr lang="bg-BG" smtClean="0"/>
-              <a:t>22.7.2022 г.</a:t>
+              <a:t>23.7.2022 г.</a:t>
             </a:fld>
             <a:endParaRPr lang="bg-BG"/>
           </a:p>
@@ -1251,7 +1251,7 @@
           <a:p>
             <a:fld id="{4346FDB3-09F2-4348-8F47-4013D9DCE7EC}" type="datetimeFigureOut">
               <a:rPr lang="bg-BG" smtClean="0"/>
-              <a:t>22.7.2022 г.</a:t>
+              <a:t>23.7.2022 г.</a:t>
             </a:fld>
             <a:endParaRPr lang="bg-BG"/>
           </a:p>
@@ -1618,7 +1618,7 @@
           <a:p>
             <a:fld id="{4346FDB3-09F2-4348-8F47-4013D9DCE7EC}" type="datetimeFigureOut">
               <a:rPr lang="bg-BG" smtClean="0"/>
-              <a:t>22.7.2022 г.</a:t>
+              <a:t>23.7.2022 г.</a:t>
             </a:fld>
             <a:endParaRPr lang="bg-BG"/>
           </a:p>
@@ -1736,7 +1736,7 @@
           <a:p>
             <a:fld id="{4346FDB3-09F2-4348-8F47-4013D9DCE7EC}" type="datetimeFigureOut">
               <a:rPr lang="bg-BG" smtClean="0"/>
-              <a:t>22.7.2022 г.</a:t>
+              <a:t>23.7.2022 г.</a:t>
             </a:fld>
             <a:endParaRPr lang="bg-BG"/>
           </a:p>
@@ -1831,7 +1831,7 @@
           <a:p>
             <a:fld id="{4346FDB3-09F2-4348-8F47-4013D9DCE7EC}" type="datetimeFigureOut">
               <a:rPr lang="bg-BG" smtClean="0"/>
-              <a:t>22.7.2022 г.</a:t>
+              <a:t>23.7.2022 г.</a:t>
             </a:fld>
             <a:endParaRPr lang="bg-BG"/>
           </a:p>
@@ -2108,7 +2108,7 @@
           <a:p>
             <a:fld id="{4346FDB3-09F2-4348-8F47-4013D9DCE7EC}" type="datetimeFigureOut">
               <a:rPr lang="bg-BG" smtClean="0"/>
-              <a:t>22.7.2022 г.</a:t>
+              <a:t>23.7.2022 г.</a:t>
             </a:fld>
             <a:endParaRPr lang="bg-BG"/>
           </a:p>
@@ -2365,7 +2365,7 @@
           <a:p>
             <a:fld id="{4346FDB3-09F2-4348-8F47-4013D9DCE7EC}" type="datetimeFigureOut">
               <a:rPr lang="bg-BG" smtClean="0"/>
-              <a:t>22.7.2022 г.</a:t>
+              <a:t>23.7.2022 г.</a:t>
             </a:fld>
             <a:endParaRPr lang="bg-BG"/>
           </a:p>
@@ -2578,7 +2578,7 @@
           <a:p>
             <a:fld id="{4346FDB3-09F2-4348-8F47-4013D9DCE7EC}" type="datetimeFigureOut">
               <a:rPr lang="bg-BG" smtClean="0"/>
-              <a:t>22.7.2022 г.</a:t>
+              <a:t>23.7.2022 г.</a:t>
             </a:fld>
             <a:endParaRPr lang="bg-BG"/>
           </a:p>
@@ -6536,6 +6536,87 @@
             </a:r>
           </a:p>
           <a:p>
+            <a:r>
+              <a:rPr lang="fr-FR" sz="1100" dirty="0" err="1">
+                <a:solidFill>
+                  <a:schemeClr val="tx1"/>
+                </a:solidFill>
+              </a:rPr>
+              <a:t>randomIn</a:t>
+            </a:r>
+            <a:r>
+              <a:rPr lang="fr-FR" sz="1100" b="0" dirty="0">
+                <a:solidFill>
+                  <a:schemeClr val="tx1"/>
+                </a:solidFill>
+              </a:rPr>
+              <a:t> (</a:t>
+            </a:r>
+            <a:r>
+              <a:rPr lang="fr-FR" sz="1100" b="0" dirty="0" err="1">
+                <a:solidFill>
+                  <a:schemeClr val="tx1">
+                    <a:lumMod val="50000"/>
+                    <a:lumOff val="50000"/>
+                  </a:schemeClr>
+                </a:solidFill>
+              </a:rPr>
+              <a:t>object</a:t>
+            </a:r>
+            <a:r>
+              <a:rPr lang="fr-FR" sz="1100" b="0" dirty="0">
+                <a:solidFill>
+                  <a:schemeClr val="tx1"/>
+                </a:solidFill>
+              </a:rPr>
+              <a:t>)</a:t>
+            </a:r>
+          </a:p>
+          <a:p>
+            <a:r>
+              <a:rPr lang="fr-FR" sz="1100" dirty="0" err="1">
+                <a:solidFill>
+                  <a:schemeClr val="tx1"/>
+                </a:solidFill>
+              </a:rPr>
+              <a:t>randomOn</a:t>
+            </a:r>
+            <a:r>
+              <a:rPr lang="fr-FR" sz="1100" b="0" dirty="0">
+                <a:solidFill>
+                  <a:schemeClr val="tx1"/>
+                </a:solidFill>
+              </a:rPr>
+              <a:t> (</a:t>
+            </a:r>
+            <a:r>
+              <a:rPr lang="fr-FR" sz="1100" b="0" dirty="0" err="1">
+                <a:solidFill>
+                  <a:schemeClr val="tx1">
+                    <a:lumMod val="50000"/>
+                    <a:lumOff val="50000"/>
+                  </a:schemeClr>
+                </a:solidFill>
+              </a:rPr>
+              <a:t>object</a:t>
+            </a:r>
+            <a:r>
+              <a:rPr lang="fr-FR" sz="1100" b="0" dirty="0">
+                <a:solidFill>
+                  <a:schemeClr val="tx1"/>
+                </a:solidFill>
+              </a:rPr>
+              <a:t>)</a:t>
+            </a:r>
+          </a:p>
+          <a:p>
+            <a:endParaRPr lang="fr-FR" sz="1100" b="0" dirty="0">
+              <a:solidFill>
+                <a:schemeClr val="tx1"/>
+              </a:solidFill>
+            </a:endParaRPr>
+          </a:p>
+          <a:p>
             <a:endParaRPr lang="en-GB" sz="1100" b="0" dirty="0">
               <a:solidFill>
                 <a:srgbClr val="FF0000"/>
@@ -12368,6 +12449,108 @@
               <a:t>THREE.BufferGeometry</a:t>
             </a:r>
             <a:endParaRPr lang="en-US" sz="1100" b="0" dirty="0">
+              <a:solidFill>
+                <a:schemeClr val="tx1">
+                  <a:lumMod val="50000"/>
+                  <a:lumOff val="50000"/>
+                </a:schemeClr>
+              </a:solidFill>
+            </a:endParaRPr>
+          </a:p>
+          <a:p>
+            <a:pPr>
+              <a:tabLst>
+                <a:tab pos="173038" algn="l"/>
+                <a:tab pos="2514600" algn="r"/>
+              </a:tabLst>
+            </a:pPr>
+            <a:r>
+              <a:rPr lang="en-US" sz="1200" dirty="0">
+                <a:solidFill>
+                  <a:schemeClr val="tx1"/>
+                </a:solidFill>
+              </a:rPr>
+              <a:t>.</a:t>
+            </a:r>
+            <a:r>
+              <a:rPr lang="en-US" sz="1200" dirty="0" err="1">
+                <a:solidFill>
+                  <a:schemeClr val="tx1"/>
+                </a:solidFill>
+              </a:rPr>
+              <a:t>randomIn</a:t>
+            </a:r>
+            <a:r>
+              <a:rPr lang="en-US" sz="1200" dirty="0">
+                <a:solidFill>
+                  <a:schemeClr val="tx1"/>
+                </a:solidFill>
+              </a:rPr>
+              <a:t> </a:t>
+            </a:r>
+            <a:r>
+              <a:rPr lang="en-US" sz="1200" b="0" dirty="0">
+                <a:solidFill>
+                  <a:schemeClr val="tx1">
+                    <a:lumMod val="50000"/>
+                    <a:lumOff val="50000"/>
+                  </a:schemeClr>
+                </a:solidFill>
+              </a:rPr>
+              <a:t>	</a:t>
+            </a:r>
+            <a:r>
+              <a:rPr lang="en-GB" sz="1200" b="0" dirty="0">
+                <a:solidFill>
+                  <a:schemeClr val="tx1">
+                    <a:lumMod val="50000"/>
+                    <a:lumOff val="50000"/>
+                  </a:schemeClr>
+                </a:solidFill>
+              </a:rPr>
+              <a:t>square, cube</a:t>
+            </a:r>
+            <a:endParaRPr lang="en-US" sz="1200" dirty="0">
+              <a:solidFill>
+                <a:schemeClr val="tx1"/>
+              </a:solidFill>
+            </a:endParaRPr>
+          </a:p>
+          <a:p>
+            <a:pPr>
+              <a:tabLst>
+                <a:tab pos="173038" algn="l"/>
+                <a:tab pos="2514600" algn="r"/>
+              </a:tabLst>
+            </a:pPr>
+            <a:r>
+              <a:rPr lang="en-US" sz="1200" dirty="0">
+                <a:solidFill>
+                  <a:schemeClr val="tx1"/>
+                </a:solidFill>
+              </a:rPr>
+              <a:t>.</a:t>
+            </a:r>
+            <a:r>
+              <a:rPr lang="en-US" sz="1200" dirty="0" err="1">
+                <a:solidFill>
+                  <a:schemeClr val="tx1"/>
+                </a:solidFill>
+              </a:rPr>
+              <a:t>randomOn</a:t>
+            </a:r>
+            <a:r>
+              <a:rPr lang="en-GB" sz="1200" b="0">
+                <a:solidFill>
+                  <a:schemeClr val="tx1">
+                    <a:lumMod val="50000"/>
+                    <a:lumOff val="50000"/>
+                  </a:schemeClr>
+                </a:solidFill>
+              </a:rPr>
+              <a:t>	square, cube</a:t>
+            </a:r>
+            <a:endParaRPr lang="en-US" sz="1200" dirty="0">
               <a:solidFill>
                 <a:schemeClr val="tx1">
                   <a:lumMod val="50000"/>

</xml_diff>

<commit_message>
Added randomIn/On for lines
</commit_message>
<xml_diff>
--- a/docs/cheat-sheet.pptx
+++ b/docs/cheat-sheet.pptx
@@ -255,7 +255,7 @@
           <a:p>
             <a:fld id="{4346FDB3-09F2-4348-8F47-4013D9DCE7EC}" type="datetimeFigureOut">
               <a:rPr lang="bg-BG" smtClean="0"/>
-              <a:t>23.7.2022 г.</a:t>
+              <a:t>24.7.2022 г.</a:t>
             </a:fld>
             <a:endParaRPr lang="bg-BG"/>
           </a:p>
@@ -425,7 +425,7 @@
           <a:p>
             <a:fld id="{4346FDB3-09F2-4348-8F47-4013D9DCE7EC}" type="datetimeFigureOut">
               <a:rPr lang="bg-BG" smtClean="0"/>
-              <a:t>23.7.2022 г.</a:t>
+              <a:t>24.7.2022 г.</a:t>
             </a:fld>
             <a:endParaRPr lang="bg-BG"/>
           </a:p>
@@ -605,7 +605,7 @@
           <a:p>
             <a:fld id="{4346FDB3-09F2-4348-8F47-4013D9DCE7EC}" type="datetimeFigureOut">
               <a:rPr lang="bg-BG" smtClean="0"/>
-              <a:t>23.7.2022 г.</a:t>
+              <a:t>24.7.2022 г.</a:t>
             </a:fld>
             <a:endParaRPr lang="bg-BG"/>
           </a:p>
@@ -775,7 +775,7 @@
           <a:p>
             <a:fld id="{4346FDB3-09F2-4348-8F47-4013D9DCE7EC}" type="datetimeFigureOut">
               <a:rPr lang="bg-BG" smtClean="0"/>
-              <a:t>23.7.2022 г.</a:t>
+              <a:t>24.7.2022 г.</a:t>
             </a:fld>
             <a:endParaRPr lang="bg-BG"/>
           </a:p>
@@ -1019,7 +1019,7 @@
           <a:p>
             <a:fld id="{4346FDB3-09F2-4348-8F47-4013D9DCE7EC}" type="datetimeFigureOut">
               <a:rPr lang="bg-BG" smtClean="0"/>
-              <a:t>23.7.2022 г.</a:t>
+              <a:t>24.7.2022 г.</a:t>
             </a:fld>
             <a:endParaRPr lang="bg-BG"/>
           </a:p>
@@ -1251,7 +1251,7 @@
           <a:p>
             <a:fld id="{4346FDB3-09F2-4348-8F47-4013D9DCE7EC}" type="datetimeFigureOut">
               <a:rPr lang="bg-BG" smtClean="0"/>
-              <a:t>23.7.2022 г.</a:t>
+              <a:t>24.7.2022 г.</a:t>
             </a:fld>
             <a:endParaRPr lang="bg-BG"/>
           </a:p>
@@ -1618,7 +1618,7 @@
           <a:p>
             <a:fld id="{4346FDB3-09F2-4348-8F47-4013D9DCE7EC}" type="datetimeFigureOut">
               <a:rPr lang="bg-BG" smtClean="0"/>
-              <a:t>23.7.2022 г.</a:t>
+              <a:t>24.7.2022 г.</a:t>
             </a:fld>
             <a:endParaRPr lang="bg-BG"/>
           </a:p>
@@ -1736,7 +1736,7 @@
           <a:p>
             <a:fld id="{4346FDB3-09F2-4348-8F47-4013D9DCE7EC}" type="datetimeFigureOut">
               <a:rPr lang="bg-BG" smtClean="0"/>
-              <a:t>23.7.2022 г.</a:t>
+              <a:t>24.7.2022 г.</a:t>
             </a:fld>
             <a:endParaRPr lang="bg-BG"/>
           </a:p>
@@ -1831,7 +1831,7 @@
           <a:p>
             <a:fld id="{4346FDB3-09F2-4348-8F47-4013D9DCE7EC}" type="datetimeFigureOut">
               <a:rPr lang="bg-BG" smtClean="0"/>
-              <a:t>23.7.2022 г.</a:t>
+              <a:t>24.7.2022 г.</a:t>
             </a:fld>
             <a:endParaRPr lang="bg-BG"/>
           </a:p>
@@ -2108,7 +2108,7 @@
           <a:p>
             <a:fld id="{4346FDB3-09F2-4348-8F47-4013D9DCE7EC}" type="datetimeFigureOut">
               <a:rPr lang="bg-BG" smtClean="0"/>
-              <a:t>23.7.2022 г.</a:t>
+              <a:t>24.7.2022 г.</a:t>
             </a:fld>
             <a:endParaRPr lang="bg-BG"/>
           </a:p>
@@ -2365,7 +2365,7 @@
           <a:p>
             <a:fld id="{4346FDB3-09F2-4348-8F47-4013D9DCE7EC}" type="datetimeFigureOut">
               <a:rPr lang="bg-BG" smtClean="0"/>
-              <a:t>23.7.2022 г.</a:t>
+              <a:t>24.7.2022 г.</a:t>
             </a:fld>
             <a:endParaRPr lang="bg-BG"/>
           </a:p>
@@ -2578,7 +2578,7 @@
           <a:p>
             <a:fld id="{4346FDB3-09F2-4348-8F47-4013D9DCE7EC}" type="datetimeFigureOut">
               <a:rPr lang="bg-BG" smtClean="0"/>
-              <a:t>23.7.2022 г.</a:t>
+              <a:t>24.7.2022 г.</a:t>
             </a:fld>
             <a:endParaRPr lang="bg-BG"/>
           </a:p>
@@ -12497,7 +12497,7 @@
                   </a:schemeClr>
                 </a:solidFill>
               </a:rPr>
-              <a:t>	</a:t>
+              <a:t>	line, </a:t>
             </a:r>
             <a:r>
               <a:rPr lang="en-GB" sz="1200" b="0" dirty="0">
@@ -12540,15 +12540,15 @@
               <a:t>randomOn</a:t>
             </a:r>
             <a:r>
-              <a:rPr lang="en-GB" sz="1200" b="0">
-                <a:solidFill>
-                  <a:schemeClr val="tx1">
-                    <a:lumMod val="50000"/>
-                    <a:lumOff val="50000"/>
-                  </a:schemeClr>
-                </a:solidFill>
-              </a:rPr>
-              <a:t>	square, cube</a:t>
+              <a:rPr lang="en-GB" sz="1200" b="0" dirty="0">
+                <a:solidFill>
+                  <a:schemeClr val="tx1">
+                    <a:lumMod val="50000"/>
+                    <a:lumOff val="50000"/>
+                  </a:schemeClr>
+                </a:solidFill>
+              </a:rPr>
+              <a:t>	line, square, cube</a:t>
             </a:r>
             <a:endParaRPr lang="en-US" sz="1200" dirty="0">
               <a:solidFill>

</xml_diff>

<commit_message>
Added randomOn/In for circles + examples + docs
</commit_message>
<xml_diff>
--- a/docs/cheat-sheet.pptx
+++ b/docs/cheat-sheet.pptx
@@ -255,7 +255,7 @@
           <a:p>
             <a:fld id="{4346FDB3-09F2-4348-8F47-4013D9DCE7EC}" type="datetimeFigureOut">
               <a:rPr lang="bg-BG" smtClean="0"/>
-              <a:t>24.7.2022 г.</a:t>
+              <a:t>25.7.2022 г.</a:t>
             </a:fld>
             <a:endParaRPr lang="bg-BG"/>
           </a:p>
@@ -425,7 +425,7 @@
           <a:p>
             <a:fld id="{4346FDB3-09F2-4348-8F47-4013D9DCE7EC}" type="datetimeFigureOut">
               <a:rPr lang="bg-BG" smtClean="0"/>
-              <a:t>24.7.2022 г.</a:t>
+              <a:t>25.7.2022 г.</a:t>
             </a:fld>
             <a:endParaRPr lang="bg-BG"/>
           </a:p>
@@ -605,7 +605,7 @@
           <a:p>
             <a:fld id="{4346FDB3-09F2-4348-8F47-4013D9DCE7EC}" type="datetimeFigureOut">
               <a:rPr lang="bg-BG" smtClean="0"/>
-              <a:t>24.7.2022 г.</a:t>
+              <a:t>25.7.2022 г.</a:t>
             </a:fld>
             <a:endParaRPr lang="bg-BG"/>
           </a:p>
@@ -775,7 +775,7 @@
           <a:p>
             <a:fld id="{4346FDB3-09F2-4348-8F47-4013D9DCE7EC}" type="datetimeFigureOut">
               <a:rPr lang="bg-BG" smtClean="0"/>
-              <a:t>24.7.2022 г.</a:t>
+              <a:t>25.7.2022 г.</a:t>
             </a:fld>
             <a:endParaRPr lang="bg-BG"/>
           </a:p>
@@ -1019,7 +1019,7 @@
           <a:p>
             <a:fld id="{4346FDB3-09F2-4348-8F47-4013D9DCE7EC}" type="datetimeFigureOut">
               <a:rPr lang="bg-BG" smtClean="0"/>
-              <a:t>24.7.2022 г.</a:t>
+              <a:t>25.7.2022 г.</a:t>
             </a:fld>
             <a:endParaRPr lang="bg-BG"/>
           </a:p>
@@ -1251,7 +1251,7 @@
           <a:p>
             <a:fld id="{4346FDB3-09F2-4348-8F47-4013D9DCE7EC}" type="datetimeFigureOut">
               <a:rPr lang="bg-BG" smtClean="0"/>
-              <a:t>24.7.2022 г.</a:t>
+              <a:t>25.7.2022 г.</a:t>
             </a:fld>
             <a:endParaRPr lang="bg-BG"/>
           </a:p>
@@ -1618,7 +1618,7 @@
           <a:p>
             <a:fld id="{4346FDB3-09F2-4348-8F47-4013D9DCE7EC}" type="datetimeFigureOut">
               <a:rPr lang="bg-BG" smtClean="0"/>
-              <a:t>24.7.2022 г.</a:t>
+              <a:t>25.7.2022 г.</a:t>
             </a:fld>
             <a:endParaRPr lang="bg-BG"/>
           </a:p>
@@ -1736,7 +1736,7 @@
           <a:p>
             <a:fld id="{4346FDB3-09F2-4348-8F47-4013D9DCE7EC}" type="datetimeFigureOut">
               <a:rPr lang="bg-BG" smtClean="0"/>
-              <a:t>24.7.2022 г.</a:t>
+              <a:t>25.7.2022 г.</a:t>
             </a:fld>
             <a:endParaRPr lang="bg-BG"/>
           </a:p>
@@ -1831,7 +1831,7 @@
           <a:p>
             <a:fld id="{4346FDB3-09F2-4348-8F47-4013D9DCE7EC}" type="datetimeFigureOut">
               <a:rPr lang="bg-BG" smtClean="0"/>
-              <a:t>24.7.2022 г.</a:t>
+              <a:t>25.7.2022 г.</a:t>
             </a:fld>
             <a:endParaRPr lang="bg-BG"/>
           </a:p>
@@ -2108,7 +2108,7 @@
           <a:p>
             <a:fld id="{4346FDB3-09F2-4348-8F47-4013D9DCE7EC}" type="datetimeFigureOut">
               <a:rPr lang="bg-BG" smtClean="0"/>
-              <a:t>24.7.2022 г.</a:t>
+              <a:t>25.7.2022 г.</a:t>
             </a:fld>
             <a:endParaRPr lang="bg-BG"/>
           </a:p>
@@ -2365,7 +2365,7 @@
           <a:p>
             <a:fld id="{4346FDB3-09F2-4348-8F47-4013D9DCE7EC}" type="datetimeFigureOut">
               <a:rPr lang="bg-BG" smtClean="0"/>
-              <a:t>24.7.2022 г.</a:t>
+              <a:t>25.7.2022 г.</a:t>
             </a:fld>
             <a:endParaRPr lang="bg-BG"/>
           </a:p>
@@ -2578,7 +2578,7 @@
           <a:p>
             <a:fld id="{4346FDB3-09F2-4348-8F47-4013D9DCE7EC}" type="datetimeFigureOut">
               <a:rPr lang="bg-BG" smtClean="0"/>
-              <a:t>24.7.2022 г.</a:t>
+              <a:t>25.7.2022 г.</a:t>
             </a:fld>
             <a:endParaRPr lang="bg-BG"/>
           </a:p>
@@ -12480,36 +12480,6 @@
               </a:rPr>
               <a:t>randomIn</a:t>
             </a:r>
-            <a:r>
-              <a:rPr lang="en-US" sz="1200" dirty="0">
-                <a:solidFill>
-                  <a:schemeClr val="tx1"/>
-                </a:solidFill>
-              </a:rPr>
-              <a:t> </a:t>
-            </a:r>
-            <a:r>
-              <a:rPr lang="en-US" sz="1200" b="0" dirty="0">
-                <a:solidFill>
-                  <a:schemeClr val="tx1">
-                    <a:lumMod val="50000"/>
-                    <a:lumOff val="50000"/>
-                  </a:schemeClr>
-                </a:solidFill>
-              </a:rPr>
-              <a:t>	line, </a:t>
-            </a:r>
-            <a:r>
-              <a:rPr lang="en-GB" sz="1200" b="0" dirty="0">
-                <a:solidFill>
-                  <a:schemeClr val="tx1">
-                    <a:lumMod val="50000"/>
-                    <a:lumOff val="50000"/>
-                  </a:schemeClr>
-                </a:solidFill>
-              </a:rPr>
-              <a:t>square, cube</a:t>
-            </a:r>
             <a:endParaRPr lang="en-US" sz="1200" dirty="0">
               <a:solidFill>
                 <a:schemeClr val="tx1"/>
@@ -12539,33 +12509,6 @@
               </a:rPr>
               <a:t>randomOn</a:t>
             </a:r>
-            <a:r>
-              <a:rPr lang="en-GB" sz="1200" b="0" dirty="0">
-                <a:solidFill>
-                  <a:schemeClr val="tx1">
-                    <a:lumMod val="50000"/>
-                    <a:lumOff val="50000"/>
-                  </a:schemeClr>
-                </a:solidFill>
-              </a:rPr>
-              <a:t>	line, square, cube</a:t>
-            </a:r>
-            <a:endParaRPr lang="en-US" sz="1200" dirty="0">
-              <a:solidFill>
-                <a:schemeClr val="tx1">
-                  <a:lumMod val="50000"/>
-                  <a:lumOff val="50000"/>
-                </a:schemeClr>
-              </a:solidFill>
-            </a:endParaRPr>
-          </a:p>
-          <a:p>
-            <a:pPr lvl="0">
-              <a:tabLst>
-                <a:tab pos="173038" algn="l"/>
-                <a:tab pos="2174875" algn="r"/>
-              </a:tabLst>
-            </a:pPr>
             <a:endParaRPr lang="fr-FR" sz="1200" b="0" dirty="0">
               <a:solidFill>
                 <a:srgbClr val="FF0000"/>

</xml_diff>

<commit_message>
Documented `findObject/s` parameter `interactive`
</commit_message>
<xml_diff>
--- a/docs/cheat-sheet.pptx
+++ b/docs/cheat-sheet.pptx
@@ -255,7 +255,7 @@
           <a:p>
             <a:fld id="{4346FDB3-09F2-4348-8F47-4013D9DCE7EC}" type="datetimeFigureOut">
               <a:rPr lang="bg-BG" smtClean="0"/>
-              <a:t>25.7.2022 г.</a:t>
+              <a:t>1.8.2022 г.</a:t>
             </a:fld>
             <a:endParaRPr lang="bg-BG"/>
           </a:p>
@@ -425,7 +425,7 @@
           <a:p>
             <a:fld id="{4346FDB3-09F2-4348-8F47-4013D9DCE7EC}" type="datetimeFigureOut">
               <a:rPr lang="bg-BG" smtClean="0"/>
-              <a:t>25.7.2022 г.</a:t>
+              <a:t>1.8.2022 г.</a:t>
             </a:fld>
             <a:endParaRPr lang="bg-BG"/>
           </a:p>
@@ -605,7 +605,7 @@
           <a:p>
             <a:fld id="{4346FDB3-09F2-4348-8F47-4013D9DCE7EC}" type="datetimeFigureOut">
               <a:rPr lang="bg-BG" smtClean="0"/>
-              <a:t>25.7.2022 г.</a:t>
+              <a:t>1.8.2022 г.</a:t>
             </a:fld>
             <a:endParaRPr lang="bg-BG"/>
           </a:p>
@@ -775,7 +775,7 @@
           <a:p>
             <a:fld id="{4346FDB3-09F2-4348-8F47-4013D9DCE7EC}" type="datetimeFigureOut">
               <a:rPr lang="bg-BG" smtClean="0"/>
-              <a:t>25.7.2022 г.</a:t>
+              <a:t>1.8.2022 г.</a:t>
             </a:fld>
             <a:endParaRPr lang="bg-BG"/>
           </a:p>
@@ -1019,7 +1019,7 @@
           <a:p>
             <a:fld id="{4346FDB3-09F2-4348-8F47-4013D9DCE7EC}" type="datetimeFigureOut">
               <a:rPr lang="bg-BG" smtClean="0"/>
-              <a:t>25.7.2022 г.</a:t>
+              <a:t>1.8.2022 г.</a:t>
             </a:fld>
             <a:endParaRPr lang="bg-BG"/>
           </a:p>
@@ -1251,7 +1251,7 @@
           <a:p>
             <a:fld id="{4346FDB3-09F2-4348-8F47-4013D9DCE7EC}" type="datetimeFigureOut">
               <a:rPr lang="bg-BG" smtClean="0"/>
-              <a:t>25.7.2022 г.</a:t>
+              <a:t>1.8.2022 г.</a:t>
             </a:fld>
             <a:endParaRPr lang="bg-BG"/>
           </a:p>
@@ -1618,7 +1618,7 @@
           <a:p>
             <a:fld id="{4346FDB3-09F2-4348-8F47-4013D9DCE7EC}" type="datetimeFigureOut">
               <a:rPr lang="bg-BG" smtClean="0"/>
-              <a:t>25.7.2022 г.</a:t>
+              <a:t>1.8.2022 г.</a:t>
             </a:fld>
             <a:endParaRPr lang="bg-BG"/>
           </a:p>
@@ -1736,7 +1736,7 @@
           <a:p>
             <a:fld id="{4346FDB3-09F2-4348-8F47-4013D9DCE7EC}" type="datetimeFigureOut">
               <a:rPr lang="bg-BG" smtClean="0"/>
-              <a:t>25.7.2022 г.</a:t>
+              <a:t>1.8.2022 г.</a:t>
             </a:fld>
             <a:endParaRPr lang="bg-BG"/>
           </a:p>
@@ -1831,7 +1831,7 @@
           <a:p>
             <a:fld id="{4346FDB3-09F2-4348-8F47-4013D9DCE7EC}" type="datetimeFigureOut">
               <a:rPr lang="bg-BG" smtClean="0"/>
-              <a:t>25.7.2022 г.</a:t>
+              <a:t>1.8.2022 г.</a:t>
             </a:fld>
             <a:endParaRPr lang="bg-BG"/>
           </a:p>
@@ -2108,7 +2108,7 @@
           <a:p>
             <a:fld id="{4346FDB3-09F2-4348-8F47-4013D9DCE7EC}" type="datetimeFigureOut">
               <a:rPr lang="bg-BG" smtClean="0"/>
-              <a:t>25.7.2022 г.</a:t>
+              <a:t>1.8.2022 г.</a:t>
             </a:fld>
             <a:endParaRPr lang="bg-BG"/>
           </a:p>
@@ -2365,7 +2365,7 @@
           <a:p>
             <a:fld id="{4346FDB3-09F2-4348-8F47-4013D9DCE7EC}" type="datetimeFigureOut">
               <a:rPr lang="bg-BG" smtClean="0"/>
-              <a:t>25.7.2022 г.</a:t>
+              <a:t>1.8.2022 г.</a:t>
             </a:fld>
             <a:endParaRPr lang="bg-BG"/>
           </a:p>
@@ -2578,7 +2578,7 @@
           <a:p>
             <a:fld id="{4346FDB3-09F2-4348-8F47-4013D9DCE7EC}" type="datetimeFigureOut">
               <a:rPr lang="bg-BG" smtClean="0"/>
-              <a:t>25.7.2022 г.</a:t>
+              <a:t>1.8.2022 г.</a:t>
             </a:fld>
             <a:endParaRPr lang="bg-BG"/>
           </a:p>
@@ -6184,7 +6184,7 @@
                   </a:schemeClr>
                 </a:solidFill>
               </a:rPr>
-              <a:t>event</a:t>
+              <a:t>event, interactive</a:t>
             </a:r>
             <a:r>
               <a:rPr lang="en-GB" sz="1100" b="0" dirty="0">
@@ -6213,7 +6213,7 @@
               <a:t> </a:t>
             </a:r>
             <a:r>
-              <a:rPr lang="en-GB" sz="1100" b="0" dirty="0">
+              <a:rPr lang="en-GB" sz="1100" b="0">
                 <a:solidFill>
                   <a:schemeClr val="tx1"/>
                 </a:solidFill>
@@ -6221,24 +6221,29 @@
               <a:t>(</a:t>
             </a:r>
             <a:r>
-              <a:rPr lang="en-GB" sz="1100" b="0" dirty="0">
-                <a:solidFill>
-                  <a:schemeClr val="tx1">
-                    <a:lumMod val="50000"/>
-                    <a:lumOff val="50000"/>
-                  </a:schemeClr>
-                </a:solidFill>
-              </a:rPr>
-              <a:t>event</a:t>
-            </a:r>
-            <a:r>
-              <a:rPr lang="en-GB" sz="1100" b="0" dirty="0">
+              <a:rPr lang="en-GB" sz="1100" b="0">
+                <a:solidFill>
+                  <a:schemeClr val="tx1">
+                    <a:lumMod val="50000"/>
+                    <a:lumOff val="50000"/>
+                  </a:schemeClr>
+                </a:solidFill>
+              </a:rPr>
+              <a:t>event, interactive</a:t>
+            </a:r>
+            <a:r>
+              <a:rPr lang="en-GB" sz="1100" b="0">
                 <a:solidFill>
                   <a:schemeClr val="tx1"/>
                 </a:solidFill>
               </a:rPr>
               <a:t>)</a:t>
             </a:r>
+            <a:endParaRPr lang="en-GB" sz="1100" b="0" dirty="0">
+              <a:solidFill>
+                <a:schemeClr val="tx1"/>
+              </a:solidFill>
+            </a:endParaRPr>
           </a:p>
           <a:p>
             <a:r>

</xml_diff>

<commit_message>
Updated cheat sheet and internal handling of shapes and drawings
</commit_message>
<xml_diff>
--- a/docs/cheat-sheet.pptx
+++ b/docs/cheat-sheet.pptx
@@ -255,7 +255,7 @@
           <a:p>
             <a:fld id="{4346FDB3-09F2-4348-8F47-4013D9DCE7EC}" type="datetimeFigureOut">
               <a:rPr lang="bg-BG" smtClean="0"/>
-              <a:t>1.8.2022 г.</a:t>
+              <a:t>4.8.2022 г.</a:t>
             </a:fld>
             <a:endParaRPr lang="bg-BG"/>
           </a:p>
@@ -425,7 +425,7 @@
           <a:p>
             <a:fld id="{4346FDB3-09F2-4348-8F47-4013D9DCE7EC}" type="datetimeFigureOut">
               <a:rPr lang="bg-BG" smtClean="0"/>
-              <a:t>1.8.2022 г.</a:t>
+              <a:t>4.8.2022 г.</a:t>
             </a:fld>
             <a:endParaRPr lang="bg-BG"/>
           </a:p>
@@ -605,7 +605,7 @@
           <a:p>
             <a:fld id="{4346FDB3-09F2-4348-8F47-4013D9DCE7EC}" type="datetimeFigureOut">
               <a:rPr lang="bg-BG" smtClean="0"/>
-              <a:t>1.8.2022 г.</a:t>
+              <a:t>4.8.2022 г.</a:t>
             </a:fld>
             <a:endParaRPr lang="bg-BG"/>
           </a:p>
@@ -775,7 +775,7 @@
           <a:p>
             <a:fld id="{4346FDB3-09F2-4348-8F47-4013D9DCE7EC}" type="datetimeFigureOut">
               <a:rPr lang="bg-BG" smtClean="0"/>
-              <a:t>1.8.2022 г.</a:t>
+              <a:t>4.8.2022 г.</a:t>
             </a:fld>
             <a:endParaRPr lang="bg-BG"/>
           </a:p>
@@ -1019,7 +1019,7 @@
           <a:p>
             <a:fld id="{4346FDB3-09F2-4348-8F47-4013D9DCE7EC}" type="datetimeFigureOut">
               <a:rPr lang="bg-BG" smtClean="0"/>
-              <a:t>1.8.2022 г.</a:t>
+              <a:t>4.8.2022 г.</a:t>
             </a:fld>
             <a:endParaRPr lang="bg-BG"/>
           </a:p>
@@ -1251,7 +1251,7 @@
           <a:p>
             <a:fld id="{4346FDB3-09F2-4348-8F47-4013D9DCE7EC}" type="datetimeFigureOut">
               <a:rPr lang="bg-BG" smtClean="0"/>
-              <a:t>1.8.2022 г.</a:t>
+              <a:t>4.8.2022 г.</a:t>
             </a:fld>
             <a:endParaRPr lang="bg-BG"/>
           </a:p>
@@ -1618,7 +1618,7 @@
           <a:p>
             <a:fld id="{4346FDB3-09F2-4348-8F47-4013D9DCE7EC}" type="datetimeFigureOut">
               <a:rPr lang="bg-BG" smtClean="0"/>
-              <a:t>1.8.2022 г.</a:t>
+              <a:t>4.8.2022 г.</a:t>
             </a:fld>
             <a:endParaRPr lang="bg-BG"/>
           </a:p>
@@ -1736,7 +1736,7 @@
           <a:p>
             <a:fld id="{4346FDB3-09F2-4348-8F47-4013D9DCE7EC}" type="datetimeFigureOut">
               <a:rPr lang="bg-BG" smtClean="0"/>
-              <a:t>1.8.2022 г.</a:t>
+              <a:t>4.8.2022 г.</a:t>
             </a:fld>
             <a:endParaRPr lang="bg-BG"/>
           </a:p>
@@ -1831,7 +1831,7 @@
           <a:p>
             <a:fld id="{4346FDB3-09F2-4348-8F47-4013D9DCE7EC}" type="datetimeFigureOut">
               <a:rPr lang="bg-BG" smtClean="0"/>
-              <a:t>1.8.2022 г.</a:t>
+              <a:t>4.8.2022 г.</a:t>
             </a:fld>
             <a:endParaRPr lang="bg-BG"/>
           </a:p>
@@ -2108,7 +2108,7 @@
           <a:p>
             <a:fld id="{4346FDB3-09F2-4348-8F47-4013D9DCE7EC}" type="datetimeFigureOut">
               <a:rPr lang="bg-BG" smtClean="0"/>
-              <a:t>1.8.2022 г.</a:t>
+              <a:t>4.8.2022 г.</a:t>
             </a:fld>
             <a:endParaRPr lang="bg-BG"/>
           </a:p>
@@ -2365,7 +2365,7 @@
           <a:p>
             <a:fld id="{4346FDB3-09F2-4348-8F47-4013D9DCE7EC}" type="datetimeFigureOut">
               <a:rPr lang="bg-BG" smtClean="0"/>
-              <a:t>1.8.2022 г.</a:t>
+              <a:t>4.8.2022 г.</a:t>
             </a:fld>
             <a:endParaRPr lang="bg-BG"/>
           </a:p>
@@ -2578,7 +2578,7 @@
           <a:p>
             <a:fld id="{4346FDB3-09F2-4348-8F47-4013D9DCE7EC}" type="datetimeFigureOut">
               <a:rPr lang="bg-BG" smtClean="0"/>
-              <a:t>1.8.2022 г.</a:t>
+              <a:t>4.8.2022 г.</a:t>
             </a:fld>
             <a:endParaRPr lang="bg-BG"/>
           </a:p>
@@ -3008,7 +3008,7 @@
         <p:spPr>
           <a:xfrm>
             <a:off x="76201" y="533400"/>
-            <a:ext cx="2438399" cy="2590799"/>
+            <a:ext cx="2348989" cy="2590800"/>
           </a:xfrm>
           <a:prstGeom prst="rect">
             <a:avLst/>
@@ -4208,7 +4208,7 @@
         <p:spPr>
           <a:xfrm>
             <a:off x="76201" y="3200400"/>
-            <a:ext cx="2438399" cy="2819399"/>
+            <a:ext cx="2355087" cy="2819399"/>
           </a:xfrm>
           <a:prstGeom prst="rect">
             <a:avLst/>
@@ -5696,7 +5696,7 @@
         <p:spPr>
           <a:xfrm>
             <a:off x="76204" y="76200"/>
-            <a:ext cx="2438396" cy="355602"/>
+            <a:ext cx="2355082" cy="367790"/>
           </a:xfrm>
           <a:prstGeom prst="rect">
             <a:avLst/>
@@ -5843,8 +5843,8 @@
         </p:nvSpPr>
         <p:spPr>
           <a:xfrm>
-            <a:off x="8229600" y="533400"/>
-            <a:ext cx="1600198" cy="2971800"/>
+            <a:off x="8153400" y="533400"/>
+            <a:ext cx="1676398" cy="2971800"/>
           </a:xfrm>
           <a:prstGeom prst="rect">
             <a:avLst/>
@@ -6213,7 +6213,7 @@
               <a:t> </a:t>
             </a:r>
             <a:r>
-              <a:rPr lang="en-GB" sz="1100" b="0">
+              <a:rPr lang="en-GB" sz="1100" b="0" dirty="0">
                 <a:solidFill>
                   <a:schemeClr val="tx1"/>
                 </a:solidFill>
@@ -6221,7 +6221,7 @@
               <a:t>(</a:t>
             </a:r>
             <a:r>
-              <a:rPr lang="en-GB" sz="1100" b="0">
+              <a:rPr lang="en-GB" sz="1100" b="0" dirty="0">
                 <a:solidFill>
                   <a:schemeClr val="tx1">
                     <a:lumMod val="50000"/>
@@ -6232,18 +6232,13 @@
               <a:t>event, interactive</a:t>
             </a:r>
             <a:r>
-              <a:rPr lang="en-GB" sz="1100" b="0">
+              <a:rPr lang="en-GB" sz="1100" b="0" dirty="0">
                 <a:solidFill>
                   <a:schemeClr val="tx1"/>
                 </a:solidFill>
               </a:rPr>
               <a:t>)</a:t>
             </a:r>
-            <a:endParaRPr lang="en-GB" sz="1100" b="0" dirty="0">
-              <a:solidFill>
-                <a:schemeClr val="tx1"/>
-              </a:solidFill>
-            </a:endParaRPr>
           </a:p>
           <a:p>
             <a:r>
@@ -6652,7 +6647,7 @@
         <p:spPr>
           <a:xfrm>
             <a:off x="76203" y="6095999"/>
-            <a:ext cx="5257797" cy="668199"/>
+            <a:ext cx="5029197" cy="668199"/>
           </a:xfrm>
           <a:prstGeom prst="rect">
             <a:avLst/>
@@ -7027,8 +7022,8 @@
         </p:nvSpPr>
         <p:spPr>
           <a:xfrm>
-            <a:off x="8229600" y="3581400"/>
-            <a:ext cx="1600198" cy="2438399"/>
+            <a:off x="8153400" y="3581401"/>
+            <a:ext cx="1676398" cy="2438398"/>
           </a:xfrm>
           <a:prstGeom prst="rect">
             <a:avLst/>
@@ -7149,7 +7144,7 @@
                   <a:schemeClr val="tx1"/>
                 </a:solidFill>
               </a:rPr>
-              <a:t>DRAWINGS	 </a:t>
+              <a:t>DRAWINGS &amp; SHAPES	 </a:t>
             </a:r>
           </a:p>
           <a:p>
@@ -7218,6 +7213,49 @@
                 </a:solidFill>
               </a:rPr>
               <a:t>color</a:t>
+            </a:r>
+            <a:r>
+              <a:rPr lang="en-GB" sz="1100" b="0" dirty="0">
+                <a:solidFill>
+                  <a:schemeClr val="tx1"/>
+                </a:solidFill>
+              </a:rPr>
+              <a:t>)</a:t>
+            </a:r>
+          </a:p>
+          <a:p>
+            <a:pPr>
+              <a:tabLst>
+                <a:tab pos="171450" algn="l"/>
+                <a:tab pos="2400300" algn="l"/>
+              </a:tabLst>
+            </a:pPr>
+            <a:r>
+              <a:rPr lang="en-GB" sz="1100" dirty="0">
+                <a:solidFill>
+                  <a:schemeClr val="tx1"/>
+                </a:solidFill>
+              </a:rPr>
+              <a:t>shape </a:t>
+            </a:r>
+            <a:r>
+              <a:rPr lang="en-GB" sz="1100" b="0" dirty="0">
+                <a:solidFill>
+                  <a:schemeClr val="tx1"/>
+                </a:solidFill>
+              </a:rPr>
+              <a:t>(</a:t>
+            </a:r>
+            <a:r>
+              <a:rPr lang="en-GB" sz="1100" b="0" dirty="0">
+                <a:solidFill>
+                  <a:schemeClr val="tx1">
+                    <a:lumMod val="50000"/>
+                    <a:lumOff val="50000"/>
+                  </a:schemeClr>
+                </a:solidFill>
+              </a:rPr>
+              <a:t>count</a:t>
             </a:r>
             <a:r>
               <a:rPr lang="en-GB" sz="1100" b="0" dirty="0">
@@ -7925,7 +7963,7 @@
                   <a:schemeClr val="tx1"/>
                 </a:solidFill>
               </a:rPr>
-              <a:t>	</a:t>
+              <a:t>	       </a:t>
             </a:r>
             <a:r>
               <a:rPr lang="en-GB" sz="1100" b="0" dirty="0">
@@ -8012,7 +8050,7 @@
         </p:nvSpPr>
         <p:spPr>
           <a:xfrm>
-            <a:off x="5410200" y="533401"/>
+            <a:off x="5334000" y="533400"/>
             <a:ext cx="2738120" cy="2971800"/>
           </a:xfrm>
           <a:prstGeom prst="rect">
@@ -8858,7 +8896,7 @@
         </p:nvSpPr>
         <p:spPr>
           <a:xfrm>
-            <a:off x="2590800" y="533401"/>
+            <a:off x="2507486" y="533399"/>
             <a:ext cx="2744218" cy="2590801"/>
           </a:xfrm>
           <a:prstGeom prst="rect">
@@ -10227,8 +10265,8 @@
         </p:nvSpPr>
         <p:spPr>
           <a:xfrm>
-            <a:off x="8229600" y="76200"/>
-            <a:ext cx="1600198" cy="355602"/>
+            <a:off x="8153400" y="76200"/>
+            <a:ext cx="1676398" cy="355602"/>
           </a:xfrm>
           <a:prstGeom prst="rect">
             <a:avLst/>
@@ -10382,8 +10420,8 @@
         </p:nvSpPr>
         <p:spPr>
           <a:xfrm>
-            <a:off x="5410200" y="6095999"/>
-            <a:ext cx="4419597" cy="668200"/>
+            <a:off x="5188714" y="6113599"/>
+            <a:ext cx="4668515" cy="668200"/>
           </a:xfrm>
           <a:prstGeom prst="rect">
             <a:avLst/>
@@ -10521,7 +10559,7 @@
         </p:nvSpPr>
         <p:spPr>
           <a:xfrm>
-            <a:off x="5410200" y="3581400"/>
+            <a:off x="5334000" y="3588421"/>
             <a:ext cx="2738120" cy="2438399"/>
           </a:xfrm>
           <a:prstGeom prst="rect">
@@ -11206,7 +11244,7 @@
         </p:nvSpPr>
         <p:spPr>
           <a:xfrm>
-            <a:off x="2595880" y="3200401"/>
+            <a:off x="2513584" y="3212740"/>
             <a:ext cx="2738120" cy="2819399"/>
           </a:xfrm>
           <a:prstGeom prst="rect">
@@ -12536,8 +12574,8 @@
         </p:nvSpPr>
         <p:spPr>
           <a:xfrm>
-            <a:off x="2590800" y="76201"/>
-            <a:ext cx="5562600" cy="367790"/>
+            <a:off x="2507486" y="76201"/>
+            <a:ext cx="5569714" cy="367790"/>
           </a:xfrm>
           <a:prstGeom prst="rect">
             <a:avLst/>
@@ -12673,6 +12711,293 @@
           </a:p>
         </p:txBody>
       </p:sp>
+      <p:sp>
+        <p:nvSpPr>
+          <p:cNvPr id="22" name="TextBox 21">
+            <a:extLst>
+              <a:ext uri="{FF2B5EF4-FFF2-40B4-BE49-F238E27FC236}">
+                <a16:creationId xmlns:a16="http://schemas.microsoft.com/office/drawing/2014/main" id="{8328D65F-0A00-42A2-9A1F-A1EEA76AC479}"/>
+              </a:ext>
+            </a:extLst>
+          </p:cNvPr>
+          <p:cNvSpPr txBox="1"/>
+          <p:nvPr/>
+        </p:nvSpPr>
+        <p:spPr>
+          <a:xfrm rot="5400000">
+            <a:off x="9392222" y="4406826"/>
+            <a:ext cx="661029" cy="214127"/>
+          </a:xfrm>
+          <a:prstGeom prst="rect">
+            <a:avLst/>
+          </a:prstGeom>
+          <a:solidFill>
+            <a:schemeClr val="bg1"/>
+          </a:solidFill>
+          <a:ln w="3175">
+            <a:noFill/>
+          </a:ln>
+        </p:spPr>
+        <p:style>
+          <a:lnRef idx="2">
+            <a:schemeClr val="accent1">
+              <a:shade val="50000"/>
+            </a:schemeClr>
+          </a:lnRef>
+          <a:fillRef idx="1">
+            <a:schemeClr val="accent1"/>
+          </a:fillRef>
+          <a:effectRef idx="0">
+            <a:schemeClr val="accent1"/>
+          </a:effectRef>
+          <a:fontRef idx="minor">
+            <a:schemeClr val="lt1"/>
+          </a:fontRef>
+        </p:style>
+        <p:txBody>
+          <a:bodyPr rot="0" spcFirstLastPara="0" vertOverflow="overflow" horzOverflow="overflow" vert="horz" wrap="square" lIns="0" tIns="0" rIns="0" bIns="0" numCol="1" spcCol="0" rtlCol="0" fromWordArt="0" anchor="t" anchorCtr="0" forceAA="0" compatLnSpc="1">
+            <a:prstTxWarp prst="textNoShape">
+              <a:avLst/>
+            </a:prstTxWarp>
+            <a:noAutofit/>
+          </a:bodyPr>
+          <a:lstStyle>
+            <a:defPPr>
+              <a:defRPr lang="en-US"/>
+            </a:defPPr>
+            <a:lvl1pPr>
+              <a:tabLst>
+                <a:tab pos="171450" algn="l"/>
+              </a:tabLst>
+              <a:defRPr sz="1000" b="1">
+                <a:solidFill>
+                  <a:schemeClr val="accent1"/>
+                </a:solidFill>
+                <a:latin typeface="Agency FB" panose="020B0503020202020204" pitchFamily="34" charset="0"/>
+              </a:defRPr>
+            </a:lvl1pPr>
+            <a:lvl2pPr>
+              <a:defRPr>
+                <a:solidFill>
+                  <a:schemeClr val="lt1"/>
+                </a:solidFill>
+              </a:defRPr>
+            </a:lvl2pPr>
+            <a:lvl3pPr>
+              <a:defRPr>
+                <a:solidFill>
+                  <a:schemeClr val="lt1"/>
+                </a:solidFill>
+              </a:defRPr>
+            </a:lvl3pPr>
+            <a:lvl4pPr>
+              <a:defRPr>
+                <a:solidFill>
+                  <a:schemeClr val="lt1"/>
+                </a:solidFill>
+              </a:defRPr>
+            </a:lvl4pPr>
+            <a:lvl5pPr>
+              <a:defRPr>
+                <a:solidFill>
+                  <a:schemeClr val="lt1"/>
+                </a:solidFill>
+              </a:defRPr>
+            </a:lvl5pPr>
+            <a:lvl6pPr>
+              <a:defRPr>
+                <a:solidFill>
+                  <a:schemeClr val="lt1"/>
+                </a:solidFill>
+              </a:defRPr>
+            </a:lvl6pPr>
+            <a:lvl7pPr>
+              <a:defRPr>
+                <a:solidFill>
+                  <a:schemeClr val="lt1"/>
+                </a:solidFill>
+              </a:defRPr>
+            </a:lvl7pPr>
+            <a:lvl8pPr>
+              <a:defRPr>
+                <a:solidFill>
+                  <a:schemeClr val="lt1"/>
+                </a:solidFill>
+              </a:defRPr>
+            </a:lvl8pPr>
+            <a:lvl9pPr>
+              <a:defRPr>
+                <a:solidFill>
+                  <a:schemeClr val="lt1"/>
+                </a:solidFill>
+              </a:defRPr>
+            </a:lvl9pPr>
+          </a:lstStyle>
+          <a:p>
+            <a:pPr algn="ctr">
+              <a:tabLst>
+                <a:tab pos="171450" algn="l"/>
+                <a:tab pos="1427163" algn="l"/>
+                <a:tab pos="1717675" algn="l"/>
+              </a:tabLst>
+            </a:pPr>
+            <a:r>
+              <a:rPr lang="en-GB" sz="1100" b="0" dirty="0">
+                <a:solidFill>
+                  <a:schemeClr val="tx1">
+                    <a:lumMod val="50000"/>
+                    <a:lumOff val="50000"/>
+                  </a:schemeClr>
+                </a:solidFill>
+              </a:rPr>
+              <a:t>shapes</a:t>
+            </a:r>
+            <a:endParaRPr lang="en-GB" sz="1100" b="0" dirty="0">
+              <a:solidFill>
+                <a:schemeClr val="tx1"/>
+              </a:solidFill>
+            </a:endParaRPr>
+          </a:p>
+        </p:txBody>
+      </p:sp>
+      <p:cxnSp>
+        <p:nvCxnSpPr>
+          <p:cNvPr id="5" name="Straight Connector 4">
+            <a:extLst>
+              <a:ext uri="{FF2B5EF4-FFF2-40B4-BE49-F238E27FC236}">
+                <a16:creationId xmlns:a16="http://schemas.microsoft.com/office/drawing/2014/main" id="{10A59D96-28D9-4795-9439-5A8DEB274D32}"/>
+              </a:ext>
+            </a:extLst>
+          </p:cNvPr>
+          <p:cNvCxnSpPr>
+            <a:cxnSpLocks/>
+          </p:cNvCxnSpPr>
+          <p:nvPr/>
+        </p:nvCxnSpPr>
+        <p:spPr>
+          <a:xfrm>
+            <a:off x="9589192" y="4191000"/>
+            <a:ext cx="80773" cy="0"/>
+          </a:xfrm>
+          <a:prstGeom prst="line">
+            <a:avLst/>
+          </a:prstGeom>
+          <a:ln>
+            <a:solidFill>
+              <a:schemeClr val="bg1">
+                <a:lumMod val="65000"/>
+              </a:schemeClr>
+            </a:solidFill>
+            <a:prstDash val="sysDot"/>
+          </a:ln>
+        </p:spPr>
+        <p:style>
+          <a:lnRef idx="1">
+            <a:schemeClr val="accent1"/>
+          </a:lnRef>
+          <a:fillRef idx="0">
+            <a:schemeClr val="accent1"/>
+          </a:fillRef>
+          <a:effectRef idx="0">
+            <a:schemeClr val="accent1"/>
+          </a:effectRef>
+          <a:fontRef idx="minor">
+            <a:schemeClr val="tx1"/>
+          </a:fontRef>
+        </p:style>
+      </p:cxnSp>
+      <p:cxnSp>
+        <p:nvCxnSpPr>
+          <p:cNvPr id="24" name="Straight Connector 23">
+            <a:extLst>
+              <a:ext uri="{FF2B5EF4-FFF2-40B4-BE49-F238E27FC236}">
+                <a16:creationId xmlns:a16="http://schemas.microsoft.com/office/drawing/2014/main" id="{86A49A61-D15B-4FE8-810A-E272685B141B}"/>
+              </a:ext>
+            </a:extLst>
+          </p:cNvPr>
+          <p:cNvCxnSpPr>
+            <a:cxnSpLocks/>
+          </p:cNvCxnSpPr>
+          <p:nvPr/>
+        </p:nvCxnSpPr>
+        <p:spPr>
+          <a:xfrm>
+            <a:off x="9589192" y="4852035"/>
+            <a:ext cx="74295" cy="0"/>
+          </a:xfrm>
+          <a:prstGeom prst="line">
+            <a:avLst/>
+          </a:prstGeom>
+          <a:ln>
+            <a:solidFill>
+              <a:schemeClr val="bg1">
+                <a:lumMod val="65000"/>
+              </a:schemeClr>
+            </a:solidFill>
+            <a:prstDash val="sysDot"/>
+          </a:ln>
+        </p:spPr>
+        <p:style>
+          <a:lnRef idx="1">
+            <a:schemeClr val="accent1"/>
+          </a:lnRef>
+          <a:fillRef idx="0">
+            <a:schemeClr val="accent1"/>
+          </a:fillRef>
+          <a:effectRef idx="0">
+            <a:schemeClr val="accent1"/>
+          </a:effectRef>
+          <a:fontRef idx="minor">
+            <a:schemeClr val="tx1"/>
+          </a:fontRef>
+        </p:style>
+      </p:cxnSp>
+      <p:cxnSp>
+        <p:nvCxnSpPr>
+          <p:cNvPr id="25" name="Straight Connector 24">
+            <a:extLst>
+              <a:ext uri="{FF2B5EF4-FFF2-40B4-BE49-F238E27FC236}">
+                <a16:creationId xmlns:a16="http://schemas.microsoft.com/office/drawing/2014/main" id="{779604E5-8361-4FB7-8066-4A021DFF3E40}"/>
+              </a:ext>
+            </a:extLst>
+          </p:cNvPr>
+          <p:cNvCxnSpPr>
+            <a:cxnSpLocks/>
+          </p:cNvCxnSpPr>
+          <p:nvPr/>
+        </p:nvCxnSpPr>
+        <p:spPr>
+          <a:xfrm>
+            <a:off x="9628818" y="4191000"/>
+            <a:ext cx="0" cy="661030"/>
+          </a:xfrm>
+          <a:prstGeom prst="line">
+            <a:avLst/>
+          </a:prstGeom>
+          <a:ln>
+            <a:solidFill>
+              <a:schemeClr val="bg1">
+                <a:lumMod val="65000"/>
+              </a:schemeClr>
+            </a:solidFill>
+            <a:prstDash val="sysDot"/>
+          </a:ln>
+        </p:spPr>
+        <p:style>
+          <a:lnRef idx="1">
+            <a:schemeClr val="accent1"/>
+          </a:lnRef>
+          <a:fillRef idx="0">
+            <a:schemeClr val="accent1"/>
+          </a:fillRef>
+          <a:effectRef idx="0">
+            <a:schemeClr val="accent1"/>
+          </a:effectRef>
+          <a:fontRef idx="minor">
+            <a:schemeClr val="tx1"/>
+          </a:fontRef>
+        </p:style>
+      </p:cxnSp>
     </p:spTree>
     <p:extLst>
       <p:ext uri="{BB962C8B-B14F-4D97-AF65-F5344CB8AC3E}">
@@ -14973,7 +15298,7 @@
                   <a:schemeClr val="tx1"/>
                 </a:solidFill>
               </a:rPr>
-              <a:t>DRAWINGS	 </a:t>
+              <a:t>DRAWINGS &amp; SHAPES	 </a:t>
             </a:r>
           </a:p>
           <a:p>
@@ -15015,6 +15340,49 @@
                 </a:solidFill>
               </a:rPr>
               <a:t>color</a:t>
+            </a:r>
+            <a:r>
+              <a:rPr lang="en-GB" sz="1100" b="0" dirty="0">
+                <a:solidFill>
+                  <a:schemeClr val="tx1"/>
+                </a:solidFill>
+              </a:rPr>
+              <a:t>&gt;</a:t>
+            </a:r>
+          </a:p>
+          <a:p>
+            <a:pPr>
+              <a:tabLst>
+                <a:tab pos="171450" algn="l"/>
+                <a:tab pos="2400300" algn="l"/>
+              </a:tabLst>
+            </a:pPr>
+            <a:r>
+              <a:rPr lang="en-GB" sz="1100" b="0" dirty="0">
+                <a:solidFill>
+                  <a:schemeClr val="tx1"/>
+                </a:solidFill>
+              </a:rPr>
+              <a:t>&lt;</a:t>
+            </a:r>
+            <a:r>
+              <a:rPr lang="en-GB" sz="1100" dirty="0">
+                <a:solidFill>
+                  <a:schemeClr val="tx1"/>
+                </a:solidFill>
+              </a:rPr>
+              <a:t>shape </a:t>
+            </a:r>
+            <a:r>
+              <a:rPr lang="en-GB" sz="1100" b="0" dirty="0">
+                <a:solidFill>
+                  <a:schemeClr val="tx1">
+                    <a:lumMod val="50000"/>
+                    <a:lumOff val="50000"/>
+                  </a:schemeClr>
+                </a:solidFill>
+              </a:rPr>
+              <a:t>count</a:t>
             </a:r>
             <a:r>
               <a:rPr lang="en-GB" sz="1100" b="0" dirty="0">
@@ -20504,6 +20872,293 @@
           </a:p>
         </p:txBody>
       </p:sp>
+      <p:sp>
+        <p:nvSpPr>
+          <p:cNvPr id="14" name="TextBox 13">
+            <a:extLst>
+              <a:ext uri="{FF2B5EF4-FFF2-40B4-BE49-F238E27FC236}">
+                <a16:creationId xmlns:a16="http://schemas.microsoft.com/office/drawing/2014/main" id="{0FA51A2D-1262-4CED-8C56-B2D3825F29F7}"/>
+              </a:ext>
+            </a:extLst>
+          </p:cNvPr>
+          <p:cNvSpPr txBox="1"/>
+          <p:nvPr/>
+        </p:nvSpPr>
+        <p:spPr>
+          <a:xfrm rot="5400000">
+            <a:off x="9392222" y="1366451"/>
+            <a:ext cx="661029" cy="214127"/>
+          </a:xfrm>
+          <a:prstGeom prst="rect">
+            <a:avLst/>
+          </a:prstGeom>
+          <a:solidFill>
+            <a:schemeClr val="bg1"/>
+          </a:solidFill>
+          <a:ln w="3175">
+            <a:noFill/>
+          </a:ln>
+        </p:spPr>
+        <p:style>
+          <a:lnRef idx="2">
+            <a:schemeClr val="accent1">
+              <a:shade val="50000"/>
+            </a:schemeClr>
+          </a:lnRef>
+          <a:fillRef idx="1">
+            <a:schemeClr val="accent1"/>
+          </a:fillRef>
+          <a:effectRef idx="0">
+            <a:schemeClr val="accent1"/>
+          </a:effectRef>
+          <a:fontRef idx="minor">
+            <a:schemeClr val="lt1"/>
+          </a:fontRef>
+        </p:style>
+        <p:txBody>
+          <a:bodyPr rot="0" spcFirstLastPara="0" vertOverflow="overflow" horzOverflow="overflow" vert="horz" wrap="square" lIns="0" tIns="0" rIns="0" bIns="0" numCol="1" spcCol="0" rtlCol="0" fromWordArt="0" anchor="t" anchorCtr="0" forceAA="0" compatLnSpc="1">
+            <a:prstTxWarp prst="textNoShape">
+              <a:avLst/>
+            </a:prstTxWarp>
+            <a:noAutofit/>
+          </a:bodyPr>
+          <a:lstStyle>
+            <a:defPPr>
+              <a:defRPr lang="en-US"/>
+            </a:defPPr>
+            <a:lvl1pPr>
+              <a:tabLst>
+                <a:tab pos="171450" algn="l"/>
+              </a:tabLst>
+              <a:defRPr sz="1000" b="1">
+                <a:solidFill>
+                  <a:schemeClr val="accent1"/>
+                </a:solidFill>
+                <a:latin typeface="Agency FB" panose="020B0503020202020204" pitchFamily="34" charset="0"/>
+              </a:defRPr>
+            </a:lvl1pPr>
+            <a:lvl2pPr>
+              <a:defRPr>
+                <a:solidFill>
+                  <a:schemeClr val="lt1"/>
+                </a:solidFill>
+              </a:defRPr>
+            </a:lvl2pPr>
+            <a:lvl3pPr>
+              <a:defRPr>
+                <a:solidFill>
+                  <a:schemeClr val="lt1"/>
+                </a:solidFill>
+              </a:defRPr>
+            </a:lvl3pPr>
+            <a:lvl4pPr>
+              <a:defRPr>
+                <a:solidFill>
+                  <a:schemeClr val="lt1"/>
+                </a:solidFill>
+              </a:defRPr>
+            </a:lvl4pPr>
+            <a:lvl5pPr>
+              <a:defRPr>
+                <a:solidFill>
+                  <a:schemeClr val="lt1"/>
+                </a:solidFill>
+              </a:defRPr>
+            </a:lvl5pPr>
+            <a:lvl6pPr>
+              <a:defRPr>
+                <a:solidFill>
+                  <a:schemeClr val="lt1"/>
+                </a:solidFill>
+              </a:defRPr>
+            </a:lvl6pPr>
+            <a:lvl7pPr>
+              <a:defRPr>
+                <a:solidFill>
+                  <a:schemeClr val="lt1"/>
+                </a:solidFill>
+              </a:defRPr>
+            </a:lvl7pPr>
+            <a:lvl8pPr>
+              <a:defRPr>
+                <a:solidFill>
+                  <a:schemeClr val="lt1"/>
+                </a:solidFill>
+              </a:defRPr>
+            </a:lvl8pPr>
+            <a:lvl9pPr>
+              <a:defRPr>
+                <a:solidFill>
+                  <a:schemeClr val="lt1"/>
+                </a:solidFill>
+              </a:defRPr>
+            </a:lvl9pPr>
+          </a:lstStyle>
+          <a:p>
+            <a:pPr algn="ctr">
+              <a:tabLst>
+                <a:tab pos="171450" algn="l"/>
+                <a:tab pos="1427163" algn="l"/>
+                <a:tab pos="1717675" algn="l"/>
+              </a:tabLst>
+            </a:pPr>
+            <a:r>
+              <a:rPr lang="en-GB" sz="1100" b="0" dirty="0">
+                <a:solidFill>
+                  <a:schemeClr val="tx1">
+                    <a:lumMod val="50000"/>
+                    <a:lumOff val="50000"/>
+                  </a:schemeClr>
+                </a:solidFill>
+              </a:rPr>
+              <a:t>shapes</a:t>
+            </a:r>
+            <a:endParaRPr lang="en-GB" sz="1100" b="0" dirty="0">
+              <a:solidFill>
+                <a:schemeClr val="tx1"/>
+              </a:solidFill>
+            </a:endParaRPr>
+          </a:p>
+        </p:txBody>
+      </p:sp>
+      <p:cxnSp>
+        <p:nvCxnSpPr>
+          <p:cNvPr id="16" name="Straight Connector 15">
+            <a:extLst>
+              <a:ext uri="{FF2B5EF4-FFF2-40B4-BE49-F238E27FC236}">
+                <a16:creationId xmlns:a16="http://schemas.microsoft.com/office/drawing/2014/main" id="{878D77DE-F536-44BC-94EB-1959CB8EE8F3}"/>
+              </a:ext>
+            </a:extLst>
+          </p:cNvPr>
+          <p:cNvCxnSpPr>
+            <a:cxnSpLocks/>
+          </p:cNvCxnSpPr>
+          <p:nvPr/>
+        </p:nvCxnSpPr>
+        <p:spPr>
+          <a:xfrm>
+            <a:off x="9589192" y="1150625"/>
+            <a:ext cx="80773" cy="0"/>
+          </a:xfrm>
+          <a:prstGeom prst="line">
+            <a:avLst/>
+          </a:prstGeom>
+          <a:ln>
+            <a:solidFill>
+              <a:schemeClr val="bg1">
+                <a:lumMod val="65000"/>
+              </a:schemeClr>
+            </a:solidFill>
+            <a:prstDash val="sysDot"/>
+          </a:ln>
+        </p:spPr>
+        <p:style>
+          <a:lnRef idx="1">
+            <a:schemeClr val="accent1"/>
+          </a:lnRef>
+          <a:fillRef idx="0">
+            <a:schemeClr val="accent1"/>
+          </a:fillRef>
+          <a:effectRef idx="0">
+            <a:schemeClr val="accent1"/>
+          </a:effectRef>
+          <a:fontRef idx="minor">
+            <a:schemeClr val="tx1"/>
+          </a:fontRef>
+        </p:style>
+      </p:cxnSp>
+      <p:cxnSp>
+        <p:nvCxnSpPr>
+          <p:cNvPr id="18" name="Straight Connector 17">
+            <a:extLst>
+              <a:ext uri="{FF2B5EF4-FFF2-40B4-BE49-F238E27FC236}">
+                <a16:creationId xmlns:a16="http://schemas.microsoft.com/office/drawing/2014/main" id="{E3563119-5622-411C-B8E0-328F8B4D21CE}"/>
+              </a:ext>
+            </a:extLst>
+          </p:cNvPr>
+          <p:cNvCxnSpPr>
+            <a:cxnSpLocks/>
+          </p:cNvCxnSpPr>
+          <p:nvPr/>
+        </p:nvCxnSpPr>
+        <p:spPr>
+          <a:xfrm>
+            <a:off x="9589192" y="1811660"/>
+            <a:ext cx="74295" cy="0"/>
+          </a:xfrm>
+          <a:prstGeom prst="line">
+            <a:avLst/>
+          </a:prstGeom>
+          <a:ln>
+            <a:solidFill>
+              <a:schemeClr val="bg1">
+                <a:lumMod val="65000"/>
+              </a:schemeClr>
+            </a:solidFill>
+            <a:prstDash val="sysDot"/>
+          </a:ln>
+        </p:spPr>
+        <p:style>
+          <a:lnRef idx="1">
+            <a:schemeClr val="accent1"/>
+          </a:lnRef>
+          <a:fillRef idx="0">
+            <a:schemeClr val="accent1"/>
+          </a:fillRef>
+          <a:effectRef idx="0">
+            <a:schemeClr val="accent1"/>
+          </a:effectRef>
+          <a:fontRef idx="minor">
+            <a:schemeClr val="tx1"/>
+          </a:fontRef>
+        </p:style>
+      </p:cxnSp>
+      <p:cxnSp>
+        <p:nvCxnSpPr>
+          <p:cNvPr id="23" name="Straight Connector 22">
+            <a:extLst>
+              <a:ext uri="{FF2B5EF4-FFF2-40B4-BE49-F238E27FC236}">
+                <a16:creationId xmlns:a16="http://schemas.microsoft.com/office/drawing/2014/main" id="{02A668C8-9AE0-4AE7-8D62-02BADA09B4BA}"/>
+              </a:ext>
+            </a:extLst>
+          </p:cNvPr>
+          <p:cNvCxnSpPr>
+            <a:cxnSpLocks/>
+          </p:cNvCxnSpPr>
+          <p:nvPr/>
+        </p:nvCxnSpPr>
+        <p:spPr>
+          <a:xfrm>
+            <a:off x="9628818" y="1150625"/>
+            <a:ext cx="0" cy="661030"/>
+          </a:xfrm>
+          <a:prstGeom prst="line">
+            <a:avLst/>
+          </a:prstGeom>
+          <a:ln>
+            <a:solidFill>
+              <a:schemeClr val="bg1">
+                <a:lumMod val="65000"/>
+              </a:schemeClr>
+            </a:solidFill>
+            <a:prstDash val="sysDot"/>
+          </a:ln>
+        </p:spPr>
+        <p:style>
+          <a:lnRef idx="1">
+            <a:schemeClr val="accent1"/>
+          </a:lnRef>
+          <a:fillRef idx="0">
+            <a:schemeClr val="accent1"/>
+          </a:fillRef>
+          <a:effectRef idx="0">
+            <a:schemeClr val="accent1"/>
+          </a:effectRef>
+          <a:fontRef idx="minor">
+            <a:schemeClr val="tx1"/>
+          </a:fontRef>
+        </p:style>
+      </p:cxnSp>
     </p:spTree>
     <p:extLst>
       <p:ext uri="{BB962C8B-B14F-4D97-AF65-F5344CB8AC3E}">

</xml_diff>

<commit_message>
Update cheat sheet with info about extrude
</commit_message>
<xml_diff>
--- a/docs/cheat-sheet.pptx
+++ b/docs/cheat-sheet.pptx
@@ -255,7 +255,7 @@
           <a:p>
             <a:fld id="{4346FDB3-09F2-4348-8F47-4013D9DCE7EC}" type="datetimeFigureOut">
               <a:rPr lang="bg-BG" smtClean="0"/>
-              <a:t>4.8.2022 г.</a:t>
+              <a:t>10.8.2022 г.</a:t>
             </a:fld>
             <a:endParaRPr lang="bg-BG"/>
           </a:p>
@@ -425,7 +425,7 @@
           <a:p>
             <a:fld id="{4346FDB3-09F2-4348-8F47-4013D9DCE7EC}" type="datetimeFigureOut">
               <a:rPr lang="bg-BG" smtClean="0"/>
-              <a:t>4.8.2022 г.</a:t>
+              <a:t>10.8.2022 г.</a:t>
             </a:fld>
             <a:endParaRPr lang="bg-BG"/>
           </a:p>
@@ -605,7 +605,7 @@
           <a:p>
             <a:fld id="{4346FDB3-09F2-4348-8F47-4013D9DCE7EC}" type="datetimeFigureOut">
               <a:rPr lang="bg-BG" smtClean="0"/>
-              <a:t>4.8.2022 г.</a:t>
+              <a:t>10.8.2022 г.</a:t>
             </a:fld>
             <a:endParaRPr lang="bg-BG"/>
           </a:p>
@@ -775,7 +775,7 @@
           <a:p>
             <a:fld id="{4346FDB3-09F2-4348-8F47-4013D9DCE7EC}" type="datetimeFigureOut">
               <a:rPr lang="bg-BG" smtClean="0"/>
-              <a:t>4.8.2022 г.</a:t>
+              <a:t>10.8.2022 г.</a:t>
             </a:fld>
             <a:endParaRPr lang="bg-BG"/>
           </a:p>
@@ -1019,7 +1019,7 @@
           <a:p>
             <a:fld id="{4346FDB3-09F2-4348-8F47-4013D9DCE7EC}" type="datetimeFigureOut">
               <a:rPr lang="bg-BG" smtClean="0"/>
-              <a:t>4.8.2022 г.</a:t>
+              <a:t>10.8.2022 г.</a:t>
             </a:fld>
             <a:endParaRPr lang="bg-BG"/>
           </a:p>
@@ -1251,7 +1251,7 @@
           <a:p>
             <a:fld id="{4346FDB3-09F2-4348-8F47-4013D9DCE7EC}" type="datetimeFigureOut">
               <a:rPr lang="bg-BG" smtClean="0"/>
-              <a:t>4.8.2022 г.</a:t>
+              <a:t>10.8.2022 г.</a:t>
             </a:fld>
             <a:endParaRPr lang="bg-BG"/>
           </a:p>
@@ -1618,7 +1618,7 @@
           <a:p>
             <a:fld id="{4346FDB3-09F2-4348-8F47-4013D9DCE7EC}" type="datetimeFigureOut">
               <a:rPr lang="bg-BG" smtClean="0"/>
-              <a:t>4.8.2022 г.</a:t>
+              <a:t>10.8.2022 г.</a:t>
             </a:fld>
             <a:endParaRPr lang="bg-BG"/>
           </a:p>
@@ -1736,7 +1736,7 @@
           <a:p>
             <a:fld id="{4346FDB3-09F2-4348-8F47-4013D9DCE7EC}" type="datetimeFigureOut">
               <a:rPr lang="bg-BG" smtClean="0"/>
-              <a:t>4.8.2022 г.</a:t>
+              <a:t>10.8.2022 г.</a:t>
             </a:fld>
             <a:endParaRPr lang="bg-BG"/>
           </a:p>
@@ -1831,7 +1831,7 @@
           <a:p>
             <a:fld id="{4346FDB3-09F2-4348-8F47-4013D9DCE7EC}" type="datetimeFigureOut">
               <a:rPr lang="bg-BG" smtClean="0"/>
-              <a:t>4.8.2022 г.</a:t>
+              <a:t>10.8.2022 г.</a:t>
             </a:fld>
             <a:endParaRPr lang="bg-BG"/>
           </a:p>
@@ -2108,7 +2108,7 @@
           <a:p>
             <a:fld id="{4346FDB3-09F2-4348-8F47-4013D9DCE7EC}" type="datetimeFigureOut">
               <a:rPr lang="bg-BG" smtClean="0"/>
-              <a:t>4.8.2022 г.</a:t>
+              <a:t>10.8.2022 г.</a:t>
             </a:fld>
             <a:endParaRPr lang="bg-BG"/>
           </a:p>
@@ -2365,7 +2365,7 @@
           <a:p>
             <a:fld id="{4346FDB3-09F2-4348-8F47-4013D9DCE7EC}" type="datetimeFigureOut">
               <a:rPr lang="bg-BG" smtClean="0"/>
-              <a:t>4.8.2022 г.</a:t>
+              <a:t>10.8.2022 г.</a:t>
             </a:fld>
             <a:endParaRPr lang="bg-BG"/>
           </a:p>
@@ -2578,7 +2578,7 @@
           <a:p>
             <a:fld id="{4346FDB3-09F2-4348-8F47-4013D9DCE7EC}" type="datetimeFigureOut">
               <a:rPr lang="bg-BG" smtClean="0"/>
-              <a:t>4.8.2022 г.</a:t>
+              <a:t>10.8.2022 г.</a:t>
             </a:fld>
             <a:endParaRPr lang="bg-BG"/>
           </a:p>
@@ -5289,6 +5289,144 @@
               <a:t>) </a:t>
             </a:r>
             <a:r>
+              <a:rPr lang="en-US" sz="1100" dirty="0">
+                <a:solidFill>
+                  <a:schemeClr val="tx1"/>
+                </a:solidFill>
+              </a:rPr>
+              <a:t>extrude</a:t>
+            </a:r>
+            <a:r>
+              <a:rPr lang="en-GB" sz="1100" b="0" dirty="0">
+                <a:solidFill>
+                  <a:schemeClr val="tx1"/>
+                </a:solidFill>
+              </a:rPr>
+              <a:t> (</a:t>
+            </a:r>
+            <a:r>
+              <a:rPr lang="en-GB" sz="1100" b="0" dirty="0">
+                <a:solidFill>
+                  <a:schemeClr val="tx1">
+                    <a:lumMod val="50000"/>
+                    <a:lumOff val="50000"/>
+                  </a:schemeClr>
+                </a:solidFill>
+              </a:rPr>
+              <a:t>shape</a:t>
+            </a:r>
+            <a:r>
+              <a:rPr lang="en-GB" sz="1100" b="0" dirty="0">
+                <a:solidFill>
+                  <a:schemeClr val="tx1"/>
+                </a:solidFill>
+              </a:rPr>
+              <a:t>, </a:t>
+            </a:r>
+            <a:r>
+              <a:rPr lang="en-GB" sz="1100" b="0" dirty="0" err="1">
+                <a:solidFill>
+                  <a:schemeClr val="tx1">
+                    <a:lumMod val="50000"/>
+                    <a:lumOff val="50000"/>
+                  </a:schemeClr>
+                </a:solidFill>
+              </a:rPr>
+              <a:t>center</a:t>
+            </a:r>
+            <a:r>
+              <a:rPr lang="en-GB" sz="1100" b="0" dirty="0">
+                <a:solidFill>
+                  <a:schemeClr val="tx1"/>
+                </a:solidFill>
+              </a:rPr>
+              <a:t>, </a:t>
+            </a:r>
+            <a:r>
+              <a:rPr lang="en-GB" sz="1100" b="0" dirty="0">
+                <a:solidFill>
+                  <a:schemeClr val="tx1">
+                    <a:lumMod val="50000"/>
+                    <a:lumOff val="50000"/>
+                  </a:schemeClr>
+                </a:solidFill>
+              </a:rPr>
+              <a:t>size</a:t>
+            </a:r>
+            <a:r>
+              <a:rPr lang="en-GB" sz="1100" b="0" dirty="0">
+                <a:solidFill>
+                  <a:schemeClr val="tx1"/>
+                </a:solidFill>
+              </a:rPr>
+              <a:t>, </a:t>
+            </a:r>
+            <a:r>
+              <a:rPr lang="en-GB" sz="1100" b="0" dirty="0" err="1">
+                <a:solidFill>
+                  <a:schemeClr val="tx1">
+                    <a:lumMod val="50000"/>
+                    <a:lumOff val="50000"/>
+                  </a:schemeClr>
+                </a:solidFill>
+              </a:rPr>
+              <a:t>color</a:t>
+            </a:r>
+            <a:r>
+              <a:rPr lang="en-GB" sz="1100" b="0" dirty="0">
+                <a:solidFill>
+                  <a:schemeClr val="tx1"/>
+                </a:solidFill>
+              </a:rPr>
+              <a:t>)</a:t>
+            </a:r>
+          </a:p>
+          <a:p>
+            <a:pPr lvl="0">
+              <a:tabLst>
+                <a:tab pos="173736" algn="l"/>
+                <a:tab pos="2743200" algn="r"/>
+              </a:tabLst>
+            </a:pPr>
+            <a:r>
+              <a:rPr lang="en-GB" sz="1100" b="0" dirty="0">
+                <a:solidFill>
+                  <a:schemeClr val="tx1">
+                    <a:lumMod val="50000"/>
+                    <a:lumOff val="50000"/>
+                  </a:schemeClr>
+                </a:solidFill>
+              </a:rPr>
+              <a:t>	.radius .offset .count</a:t>
+            </a:r>
+            <a:r>
+              <a:rPr lang="en-GB" sz="1100" b="0" baseline="30000" dirty="0">
+                <a:solidFill>
+                  <a:schemeClr val="tx1">
+                    <a:lumMod val="50000"/>
+                    <a:lumOff val="50000"/>
+                  </a:schemeClr>
+                </a:solidFill>
+              </a:rPr>
+              <a:t>1,2</a:t>
+            </a:r>
+            <a:endParaRPr lang="en-GB" sz="1100" b="0" dirty="0">
+              <a:solidFill>
+                <a:schemeClr val="tx1">
+                  <a:lumMod val="50000"/>
+                  <a:lumOff val="50000"/>
+                </a:schemeClr>
+              </a:solidFill>
+            </a:endParaRPr>
+          </a:p>
+          <a:p>
+            <a:pPr lvl="0">
+              <a:tabLst>
+                <a:tab pos="173736" algn="l"/>
+                <a:tab pos="2743200" algn="r"/>
+              </a:tabLst>
+            </a:pPr>
+            <a:r>
               <a:rPr lang="en-GB" sz="1100" dirty="0">
                 <a:solidFill>
                   <a:schemeClr val="tx1"/>
@@ -6647,7 +6785,7 @@
         <p:spPr>
           <a:xfrm>
             <a:off x="76203" y="6095999"/>
-            <a:ext cx="5029197" cy="668199"/>
+            <a:ext cx="5175501" cy="668199"/>
           </a:xfrm>
           <a:prstGeom prst="rect">
             <a:avLst/>
@@ -10420,8 +10558,8 @@
         </p:nvSpPr>
         <p:spPr>
           <a:xfrm>
-            <a:off x="5188714" y="6113599"/>
-            <a:ext cx="4668515" cy="668200"/>
+            <a:off x="5334000" y="6113599"/>
+            <a:ext cx="4495797" cy="668200"/>
           </a:xfrm>
           <a:prstGeom prst="rect">
             <a:avLst/>
@@ -13053,7 +13191,7 @@
         <p:spPr>
           <a:xfrm>
             <a:off x="76205" y="533400"/>
-            <a:ext cx="2438396" cy="2514600"/>
+            <a:ext cx="2590794" cy="2514600"/>
           </a:xfrm>
           <a:prstGeom prst="rect">
             <a:avLst/>
@@ -14023,7 +14161,7 @@
         <p:spPr>
           <a:xfrm>
             <a:off x="76205" y="3143505"/>
-            <a:ext cx="2438396" cy="2419095"/>
+            <a:ext cx="2590794" cy="2412999"/>
           </a:xfrm>
           <a:prstGeom prst="rect">
             <a:avLst/>
@@ -14905,6 +15043,103 @@
                 </a:solidFill>
               </a:rPr>
               <a:t> …</a:t>
+            </a:r>
+            <a:r>
+              <a:rPr lang="en-GB" sz="1100" b="0" dirty="0">
+                <a:solidFill>
+                  <a:schemeClr val="tx1"/>
+                </a:solidFill>
+              </a:rPr>
+              <a:t>&gt;</a:t>
+            </a:r>
+          </a:p>
+          <a:p>
+            <a:pPr>
+              <a:tabLst>
+                <a:tab pos="2286000" algn="r"/>
+              </a:tabLst>
+            </a:pPr>
+            <a:r>
+              <a:rPr lang="en-GB" sz="1100" b="0" dirty="0">
+                <a:solidFill>
+                  <a:schemeClr val="tx1"/>
+                </a:solidFill>
+              </a:rPr>
+              <a:t>&lt;</a:t>
+            </a:r>
+            <a:r>
+              <a:rPr lang="en-GB" sz="1100" dirty="0">
+                <a:solidFill>
+                  <a:schemeClr val="tx1"/>
+                </a:solidFill>
+              </a:rPr>
+              <a:t>extrude</a:t>
+            </a:r>
+            <a:r>
+              <a:rPr lang="en-GB" sz="1100" b="0" dirty="0">
+                <a:solidFill>
+                  <a:schemeClr val="tx1">
+                    <a:lumMod val="50000"/>
+                    <a:lumOff val="50000"/>
+                  </a:schemeClr>
+                </a:solidFill>
+              </a:rPr>
+              <a:t> shape </a:t>
+            </a:r>
+            <a:r>
+              <a:rPr lang="en-GB" sz="1100" b="0" dirty="0" err="1">
+                <a:solidFill>
+                  <a:schemeClr val="tx1">
+                    <a:lumMod val="50000"/>
+                    <a:lumOff val="50000"/>
+                  </a:schemeClr>
+                </a:solidFill>
+              </a:rPr>
+              <a:t>center</a:t>
+            </a:r>
+            <a:r>
+              <a:rPr lang="en-GB" sz="1100" b="0" dirty="0">
+                <a:solidFill>
+                  <a:schemeClr val="tx1">
+                    <a:lumMod val="50000"/>
+                    <a:lumOff val="50000"/>
+                  </a:schemeClr>
+                </a:solidFill>
+              </a:rPr>
+              <a:t> size </a:t>
+            </a:r>
+            <a:r>
+              <a:rPr lang="en-GB" sz="1100" b="0" dirty="0" err="1">
+                <a:solidFill>
+                  <a:schemeClr val="tx1">
+                    <a:lumMod val="50000"/>
+                    <a:lumOff val="50000"/>
+                  </a:schemeClr>
+                </a:solidFill>
+              </a:rPr>
+              <a:t>color</a:t>
+            </a:r>
+            <a:r>
+              <a:rPr lang="en-GB" sz="1100" b="0" dirty="0">
+                <a:solidFill>
+                  <a:schemeClr val="tx1">
+                    <a:lumMod val="50000"/>
+                    <a:lumOff val="50000"/>
+                  </a:schemeClr>
+                </a:solidFill>
+              </a:rPr>
+              <a:t> radius offset count</a:t>
+            </a:r>
+            <a:r>
+              <a:rPr lang="en-GB" sz="1100" b="0" baseline="30000" dirty="0">
+                <a:solidFill>
+                  <a:schemeClr val="tx1">
+                    <a:lumMod val="50000"/>
+                    <a:lumOff val="50000"/>
+                  </a:schemeClr>
+                </a:solidFill>
+              </a:rPr>
+              <a:t>1.2</a:t>
             </a:r>
             <a:r>
               <a:rPr lang="en-GB" sz="1100" b="0" dirty="0">
@@ -17362,7 +17597,7 @@
         <p:spPr>
           <a:xfrm>
             <a:off x="76204" y="76200"/>
-            <a:ext cx="2438396" cy="355602"/>
+            <a:ext cx="2590794" cy="355602"/>
           </a:xfrm>
           <a:prstGeom prst="rect">
             <a:avLst/>
@@ -17803,8 +18038,8 @@
         </p:nvSpPr>
         <p:spPr>
           <a:xfrm>
-            <a:off x="2622811" y="527306"/>
-            <a:ext cx="2472666" cy="2520694"/>
+            <a:off x="2743199" y="527306"/>
+            <a:ext cx="2352277" cy="2520694"/>
           </a:xfrm>
           <a:prstGeom prst="rect">
             <a:avLst/>
@@ -19078,8 +19313,8 @@
         </p:nvSpPr>
         <p:spPr>
           <a:xfrm>
-            <a:off x="76203" y="5658105"/>
-            <a:ext cx="9753589" cy="1117599"/>
+            <a:off x="76203" y="5645915"/>
+            <a:ext cx="9753589" cy="1129790"/>
           </a:xfrm>
           <a:prstGeom prst="rect">
             <a:avLst/>
@@ -19217,8 +19452,8 @@
         </p:nvSpPr>
         <p:spPr>
           <a:xfrm>
-            <a:off x="2621153" y="3137410"/>
-            <a:ext cx="2475980" cy="2419094"/>
+            <a:off x="2743199" y="3137410"/>
+            <a:ext cx="2353934" cy="2419094"/>
           </a:xfrm>
           <a:prstGeom prst="rect">
             <a:avLst/>
@@ -20735,8 +20970,8 @@
         </p:nvSpPr>
         <p:spPr>
           <a:xfrm>
-            <a:off x="2621152" y="76201"/>
-            <a:ext cx="5456047" cy="367790"/>
+            <a:off x="2743199" y="76201"/>
+            <a:ext cx="5334000" cy="367790"/>
           </a:xfrm>
           <a:prstGeom prst="rect">
             <a:avLst/>

</xml_diff>

<commit_message>
Fixed wrong description of "line"
</commit_message>
<xml_diff>
--- a/docs/cheat-sheet.pptx
+++ b/docs/cheat-sheet.pptx
@@ -3549,6 +3549,17 @@
             <a:r>
               <a:rPr lang="en-GB" sz="1100" b="0" dirty="0">
                 <a:solidFill>
+                  <a:schemeClr val="tx1">
+                    <a:lumMod val="50000"/>
+                    <a:lumOff val="50000"/>
+                  </a:schemeClr>
+                </a:solidFill>
+              </a:rPr>
+              <a:t>/from</a:t>
+            </a:r>
+            <a:r>
+              <a:rPr lang="en-GB" sz="1100" b="0" dirty="0">
+                <a:solidFill>
                   <a:schemeClr val="tx1"/>
                 </a:solidFill>
               </a:rPr>
@@ -3563,7 +3574,18 @@
                   </a:schemeClr>
                 </a:solidFill>
               </a:rPr>
-              <a:t> size</a:t>
+              <a:t> </a:t>
+            </a:r>
+            <a:r>
+              <a:rPr lang="en-US" sz="1100" b="0" dirty="0">
+                <a:solidFill>
+                  <a:schemeClr val="tx1">
+                    <a:lumMod val="50000"/>
+                    <a:lumOff val="50000"/>
+                  </a:schemeClr>
+                </a:solidFill>
+              </a:rPr>
+              <a:t>to</a:t>
             </a:r>
             <a:r>
               <a:rPr lang="en-GB" sz="1100" b="0" dirty="0">
@@ -13771,15 +13793,37 @@
               <a:t> </a:t>
             </a:r>
             <a:r>
-              <a:rPr lang="en-GB" sz="1100" b="0" dirty="0">
-                <a:solidFill>
-                  <a:schemeClr val="tx1">
-                    <a:lumMod val="50000"/>
-                    <a:lumOff val="50000"/>
-                  </a:schemeClr>
-                </a:solidFill>
-              </a:rPr>
-              <a:t>from to </a:t>
+              <a:rPr lang="en-GB" sz="1100" b="0" dirty="0" err="1">
+                <a:solidFill>
+                  <a:schemeClr val="tx1">
+                    <a:lumMod val="50000"/>
+                    <a:lumOff val="50000"/>
+                  </a:schemeClr>
+                </a:solidFill>
+              </a:rPr>
+              <a:t>center</a:t>
+            </a:r>
+            <a:r>
+              <a:rPr lang="en-GB" sz="1100" b="0">
+                <a:solidFill>
+                  <a:schemeClr val="tx1">
+                    <a:lumMod val="50000"/>
+                    <a:lumOff val="50000"/>
+                  </a:schemeClr>
+                </a:solidFill>
+              </a:rPr>
+              <a:t>/from </a:t>
+            </a:r>
+            <a:r>
+              <a:rPr lang="en-GB" sz="1100" b="0" dirty="0">
+                <a:solidFill>
+                  <a:schemeClr val="tx1">
+                    <a:lumMod val="50000"/>
+                    <a:lumOff val="50000"/>
+                  </a:schemeClr>
+                </a:solidFill>
+              </a:rPr>
+              <a:t>to </a:t>
             </a:r>
             <a:r>
               <a:rPr lang="en-GB" sz="1100" b="0" dirty="0" err="1">

</xml_diff>

<commit_message>
Documentation about SUICA_VERSION and SUICA_DATE
</commit_message>
<xml_diff>
--- a/docs/cheat-sheet.pptx
+++ b/docs/cheat-sheet.pptx
@@ -255,7 +255,7 @@
           <a:p>
             <a:fld id="{4346FDB3-09F2-4348-8F47-4013D9DCE7EC}" type="datetimeFigureOut">
               <a:rPr lang="bg-BG" smtClean="0"/>
-              <a:t>1.11.2022 г.</a:t>
+              <a:t>3.11.2022 г.</a:t>
             </a:fld>
             <a:endParaRPr lang="bg-BG"/>
           </a:p>
@@ -425,7 +425,7 @@
           <a:p>
             <a:fld id="{4346FDB3-09F2-4348-8F47-4013D9DCE7EC}" type="datetimeFigureOut">
               <a:rPr lang="bg-BG" smtClean="0"/>
-              <a:t>1.11.2022 г.</a:t>
+              <a:t>3.11.2022 г.</a:t>
             </a:fld>
             <a:endParaRPr lang="bg-BG"/>
           </a:p>
@@ -605,7 +605,7 @@
           <a:p>
             <a:fld id="{4346FDB3-09F2-4348-8F47-4013D9DCE7EC}" type="datetimeFigureOut">
               <a:rPr lang="bg-BG" smtClean="0"/>
-              <a:t>1.11.2022 г.</a:t>
+              <a:t>3.11.2022 г.</a:t>
             </a:fld>
             <a:endParaRPr lang="bg-BG"/>
           </a:p>
@@ -775,7 +775,7 @@
           <a:p>
             <a:fld id="{4346FDB3-09F2-4348-8F47-4013D9DCE7EC}" type="datetimeFigureOut">
               <a:rPr lang="bg-BG" smtClean="0"/>
-              <a:t>1.11.2022 г.</a:t>
+              <a:t>3.11.2022 г.</a:t>
             </a:fld>
             <a:endParaRPr lang="bg-BG"/>
           </a:p>
@@ -1019,7 +1019,7 @@
           <a:p>
             <a:fld id="{4346FDB3-09F2-4348-8F47-4013D9DCE7EC}" type="datetimeFigureOut">
               <a:rPr lang="bg-BG" smtClean="0"/>
-              <a:t>1.11.2022 г.</a:t>
+              <a:t>3.11.2022 г.</a:t>
             </a:fld>
             <a:endParaRPr lang="bg-BG"/>
           </a:p>
@@ -1251,7 +1251,7 @@
           <a:p>
             <a:fld id="{4346FDB3-09F2-4348-8F47-4013D9DCE7EC}" type="datetimeFigureOut">
               <a:rPr lang="bg-BG" smtClean="0"/>
-              <a:t>1.11.2022 г.</a:t>
+              <a:t>3.11.2022 г.</a:t>
             </a:fld>
             <a:endParaRPr lang="bg-BG"/>
           </a:p>
@@ -1618,7 +1618,7 @@
           <a:p>
             <a:fld id="{4346FDB3-09F2-4348-8F47-4013D9DCE7EC}" type="datetimeFigureOut">
               <a:rPr lang="bg-BG" smtClean="0"/>
-              <a:t>1.11.2022 г.</a:t>
+              <a:t>3.11.2022 г.</a:t>
             </a:fld>
             <a:endParaRPr lang="bg-BG"/>
           </a:p>
@@ -1736,7 +1736,7 @@
           <a:p>
             <a:fld id="{4346FDB3-09F2-4348-8F47-4013D9DCE7EC}" type="datetimeFigureOut">
               <a:rPr lang="bg-BG" smtClean="0"/>
-              <a:t>1.11.2022 г.</a:t>
+              <a:t>3.11.2022 г.</a:t>
             </a:fld>
             <a:endParaRPr lang="bg-BG"/>
           </a:p>
@@ -1831,7 +1831,7 @@
           <a:p>
             <a:fld id="{4346FDB3-09F2-4348-8F47-4013D9DCE7EC}" type="datetimeFigureOut">
               <a:rPr lang="bg-BG" smtClean="0"/>
-              <a:t>1.11.2022 г.</a:t>
+              <a:t>3.11.2022 г.</a:t>
             </a:fld>
             <a:endParaRPr lang="bg-BG"/>
           </a:p>
@@ -2108,7 +2108,7 @@
           <a:p>
             <a:fld id="{4346FDB3-09F2-4348-8F47-4013D9DCE7EC}" type="datetimeFigureOut">
               <a:rPr lang="bg-BG" smtClean="0"/>
-              <a:t>1.11.2022 г.</a:t>
+              <a:t>3.11.2022 г.</a:t>
             </a:fld>
             <a:endParaRPr lang="bg-BG"/>
           </a:p>
@@ -2365,7 +2365,7 @@
           <a:p>
             <a:fld id="{4346FDB3-09F2-4348-8F47-4013D9DCE7EC}" type="datetimeFigureOut">
               <a:rPr lang="bg-BG" smtClean="0"/>
-              <a:t>1.11.2022 г.</a:t>
+              <a:t>3.11.2022 г.</a:t>
             </a:fld>
             <a:endParaRPr lang="bg-BG"/>
           </a:p>
@@ -2578,7 +2578,7 @@
           <a:p>
             <a:fld id="{4346FDB3-09F2-4348-8F47-4013D9DCE7EC}" type="datetimeFigureOut">
               <a:rPr lang="bg-BG" smtClean="0"/>
-              <a:t>1.11.2022 г.</a:t>
+              <a:t>3.11.2022 г.</a:t>
             </a:fld>
             <a:endParaRPr lang="bg-BG"/>
           </a:p>
@@ -9156,7 +9156,17 @@
               </a:rPr>
               <a:t>)</a:t>
             </a:r>
-            <a:endParaRPr lang="en-GB" sz="1100" b="0" dirty="0">
+          </a:p>
+          <a:p>
+            <a:r>
+              <a:rPr lang="fr-FR" sz="1100" dirty="0">
+                <a:solidFill>
+                  <a:schemeClr val="tx1"/>
+                </a:solidFill>
+              </a:rPr>
+              <a:t>SUICA_VERSION, SUICA_DATE</a:t>
+            </a:r>
+            <a:endParaRPr lang="en-GB" sz="1100" dirty="0">
               <a:solidFill>
                 <a:schemeClr val="tx1"/>
               </a:solidFill>

</xml_diff>

<commit_message>
Added support for <scorm> tag
</commit_message>
<xml_diff>
--- a/docs/cheat-sheet.pptx
+++ b/docs/cheat-sheet.pptx
@@ -255,7 +255,7 @@
           <a:p>
             <a:fld id="{4346FDB3-09F2-4348-8F47-4013D9DCE7EC}" type="datetimeFigureOut">
               <a:rPr lang="bg-BG" smtClean="0"/>
-              <a:t>13.11.2022 г.</a:t>
+              <a:t>15.11.2022 г.</a:t>
             </a:fld>
             <a:endParaRPr lang="bg-BG"/>
           </a:p>
@@ -425,7 +425,7 @@
           <a:p>
             <a:fld id="{4346FDB3-09F2-4348-8F47-4013D9DCE7EC}" type="datetimeFigureOut">
               <a:rPr lang="bg-BG" smtClean="0"/>
-              <a:t>13.11.2022 г.</a:t>
+              <a:t>15.11.2022 г.</a:t>
             </a:fld>
             <a:endParaRPr lang="bg-BG"/>
           </a:p>
@@ -605,7 +605,7 @@
           <a:p>
             <a:fld id="{4346FDB3-09F2-4348-8F47-4013D9DCE7EC}" type="datetimeFigureOut">
               <a:rPr lang="bg-BG" smtClean="0"/>
-              <a:t>13.11.2022 г.</a:t>
+              <a:t>15.11.2022 г.</a:t>
             </a:fld>
             <a:endParaRPr lang="bg-BG"/>
           </a:p>
@@ -775,7 +775,7 @@
           <a:p>
             <a:fld id="{4346FDB3-09F2-4348-8F47-4013D9DCE7EC}" type="datetimeFigureOut">
               <a:rPr lang="bg-BG" smtClean="0"/>
-              <a:t>13.11.2022 г.</a:t>
+              <a:t>15.11.2022 г.</a:t>
             </a:fld>
             <a:endParaRPr lang="bg-BG"/>
           </a:p>
@@ -1019,7 +1019,7 @@
           <a:p>
             <a:fld id="{4346FDB3-09F2-4348-8F47-4013D9DCE7EC}" type="datetimeFigureOut">
               <a:rPr lang="bg-BG" smtClean="0"/>
-              <a:t>13.11.2022 г.</a:t>
+              <a:t>15.11.2022 г.</a:t>
             </a:fld>
             <a:endParaRPr lang="bg-BG"/>
           </a:p>
@@ -1251,7 +1251,7 @@
           <a:p>
             <a:fld id="{4346FDB3-09F2-4348-8F47-4013D9DCE7EC}" type="datetimeFigureOut">
               <a:rPr lang="bg-BG" smtClean="0"/>
-              <a:t>13.11.2022 г.</a:t>
+              <a:t>15.11.2022 г.</a:t>
             </a:fld>
             <a:endParaRPr lang="bg-BG"/>
           </a:p>
@@ -1618,7 +1618,7 @@
           <a:p>
             <a:fld id="{4346FDB3-09F2-4348-8F47-4013D9DCE7EC}" type="datetimeFigureOut">
               <a:rPr lang="bg-BG" smtClean="0"/>
-              <a:t>13.11.2022 г.</a:t>
+              <a:t>15.11.2022 г.</a:t>
             </a:fld>
             <a:endParaRPr lang="bg-BG"/>
           </a:p>
@@ -1736,7 +1736,7 @@
           <a:p>
             <a:fld id="{4346FDB3-09F2-4348-8F47-4013D9DCE7EC}" type="datetimeFigureOut">
               <a:rPr lang="bg-BG" smtClean="0"/>
-              <a:t>13.11.2022 г.</a:t>
+              <a:t>15.11.2022 г.</a:t>
             </a:fld>
             <a:endParaRPr lang="bg-BG"/>
           </a:p>
@@ -1831,7 +1831,7 @@
           <a:p>
             <a:fld id="{4346FDB3-09F2-4348-8F47-4013D9DCE7EC}" type="datetimeFigureOut">
               <a:rPr lang="bg-BG" smtClean="0"/>
-              <a:t>13.11.2022 г.</a:t>
+              <a:t>15.11.2022 г.</a:t>
             </a:fld>
             <a:endParaRPr lang="bg-BG"/>
           </a:p>
@@ -2108,7 +2108,7 @@
           <a:p>
             <a:fld id="{4346FDB3-09F2-4348-8F47-4013D9DCE7EC}" type="datetimeFigureOut">
               <a:rPr lang="bg-BG" smtClean="0"/>
-              <a:t>13.11.2022 г.</a:t>
+              <a:t>15.11.2022 г.</a:t>
             </a:fld>
             <a:endParaRPr lang="bg-BG"/>
           </a:p>
@@ -2365,7 +2365,7 @@
           <a:p>
             <a:fld id="{4346FDB3-09F2-4348-8F47-4013D9DCE7EC}" type="datetimeFigureOut">
               <a:rPr lang="bg-BG" smtClean="0"/>
-              <a:t>13.11.2022 г.</a:t>
+              <a:t>15.11.2022 г.</a:t>
             </a:fld>
             <a:endParaRPr lang="bg-BG"/>
           </a:p>
@@ -2578,7 +2578,7 @@
           <a:p>
             <a:fld id="{4346FDB3-09F2-4348-8F47-4013D9DCE7EC}" type="datetimeFigureOut">
               <a:rPr lang="bg-BG" smtClean="0"/>
-              <a:t>13.11.2022 г.</a:t>
+              <a:t>15.11.2022 г.</a:t>
             </a:fld>
             <a:endParaRPr lang="bg-BG"/>
           </a:p>
@@ -3008,7 +3008,7 @@
         <p:spPr>
           <a:xfrm>
             <a:off x="76201" y="533400"/>
-            <a:ext cx="2348989" cy="2590800"/>
+            <a:ext cx="2348989" cy="2209800"/>
           </a:xfrm>
           <a:prstGeom prst="rect">
             <a:avLst/>
@@ -4261,8 +4261,8 @@
         </p:nvSpPr>
         <p:spPr>
           <a:xfrm>
-            <a:off x="76201" y="3200400"/>
-            <a:ext cx="2355087" cy="2819399"/>
+            <a:off x="76201" y="2832611"/>
+            <a:ext cx="2355087" cy="2882390"/>
           </a:xfrm>
           <a:prstGeom prst="rect">
             <a:avLst/>
@@ -7018,8 +7018,8 @@
         </p:nvSpPr>
         <p:spPr>
           <a:xfrm>
-            <a:off x="76203" y="6095999"/>
-            <a:ext cx="5175501" cy="668199"/>
+            <a:off x="76203" y="5804413"/>
+            <a:ext cx="2348987" cy="959786"/>
           </a:xfrm>
           <a:prstGeom prst="rect">
             <a:avLst/>
@@ -7130,7 +7130,7 @@
             <a:pPr>
               <a:tabLst>
                 <a:tab pos="171450" algn="l"/>
-                <a:tab pos="2286000" algn="l"/>
+                <a:tab pos="2230438" algn="l"/>
                 <a:tab pos="2859088" algn="l"/>
               </a:tabLst>
             </a:pPr>
@@ -7235,7 +7235,24 @@
                   <a:schemeClr val="tx1"/>
                 </a:solidFill>
               </a:rPr>
-              <a:t>,.</a:t>
+              <a:t>,</a:t>
+            </a:r>
+          </a:p>
+          <a:p>
+            <a:pPr>
+              <a:tabLst>
+                <a:tab pos="55563" algn="l"/>
+                <a:tab pos="2228850" algn="l"/>
+                <a:tab pos="2859088" algn="l"/>
+              </a:tabLst>
+            </a:pPr>
+            <a:r>
+              <a:rPr lang="en-GB" sz="1100" b="0" dirty="0">
+                <a:solidFill>
+                  <a:schemeClr val="tx1"/>
+                </a:solidFill>
+              </a:rPr>
+              <a:t>	.</a:t>
             </a:r>
             <a:r>
               <a:rPr lang="en-GB" sz="1100" dirty="0" err="1">
@@ -7270,6 +7287,68 @@
                   </a:schemeClr>
                 </a:solidFill>
               </a:rPr>
+              <a:t>name</a:t>
+            </a:r>
+            <a:r>
+              <a:rPr lang="en-GB" sz="1100" b="0" dirty="0">
+                <a:solidFill>
+                  <a:schemeClr val="tx1"/>
+                </a:solidFill>
+              </a:rPr>
+              <a:t>) .</a:t>
+            </a:r>
+            <a:r>
+              <a:rPr lang="en-GB" sz="1100" dirty="0" err="1">
+                <a:solidFill>
+                  <a:schemeClr val="tx1"/>
+                </a:solidFill>
+              </a:rPr>
+              <a:t>setValue</a:t>
+            </a:r>
+            <a:r>
+              <a:rPr lang="en-GB" sz="1100" dirty="0">
+                <a:solidFill>
+                  <a:schemeClr val="tx1"/>
+                </a:solidFill>
+              </a:rPr>
+              <a:t> </a:t>
+            </a:r>
+            <a:r>
+              <a:rPr lang="en-GB" sz="1100" b="0" dirty="0">
+                <a:solidFill>
+                  <a:schemeClr val="tx1"/>
+                </a:solidFill>
+              </a:rPr>
+              <a:t>(</a:t>
+            </a:r>
+            <a:r>
+              <a:rPr lang="en-GB" sz="1100" b="0" dirty="0">
+                <a:solidFill>
+                  <a:schemeClr val="tx1">
+                    <a:lumMod val="50000"/>
+                    <a:lumOff val="50000"/>
+                  </a:schemeClr>
+                </a:solidFill>
+              </a:rPr>
+              <a:t>name</a:t>
+            </a:r>
+            <a:r>
+              <a:rPr lang="en-GB" sz="1100" b="0" dirty="0">
+                <a:solidFill>
+                  <a:schemeClr val="tx1"/>
+                </a:solidFill>
+              </a:rPr>
+              <a:t>, </a:t>
+            </a:r>
+            <a:r>
+              <a:rPr lang="en-GB" sz="1100" b="0" dirty="0">
+                <a:solidFill>
+                  <a:schemeClr val="tx1">
+                    <a:lumMod val="50000"/>
+                    <a:lumOff val="50000"/>
+                  </a:schemeClr>
+                </a:solidFill>
+              </a:rPr>
               <a:t>value</a:t>
             </a:r>
             <a:r>
@@ -7278,69 +7357,24 @@
                   <a:schemeClr val="tx1"/>
                 </a:solidFill>
               </a:rPr>
-              <a:t>) .</a:t>
-            </a:r>
-            <a:r>
-              <a:rPr lang="en-GB" sz="1100" dirty="0" err="1">
-                <a:solidFill>
-                  <a:schemeClr val="tx1"/>
-                </a:solidFill>
-              </a:rPr>
-              <a:t>setValue</a:t>
-            </a:r>
-            <a:r>
-              <a:rPr lang="en-GB" sz="1100" dirty="0">
-                <a:solidFill>
-                  <a:schemeClr val="tx1"/>
-                </a:solidFill>
-              </a:rPr>
-              <a:t> </a:t>
-            </a:r>
-            <a:r>
-              <a:rPr lang="en-GB" sz="1100" b="0" dirty="0">
-                <a:solidFill>
-                  <a:schemeClr val="tx1"/>
-                </a:solidFill>
-              </a:rPr>
-              <a:t>(</a:t>
-            </a:r>
-            <a:r>
-              <a:rPr lang="en-GB" sz="1100" b="0" dirty="0">
-                <a:solidFill>
-                  <a:schemeClr val="tx1">
-                    <a:lumMod val="50000"/>
-                    <a:lumOff val="50000"/>
-                  </a:schemeClr>
-                </a:solidFill>
-              </a:rPr>
-              <a:t>name</a:t>
-            </a:r>
-            <a:r>
-              <a:rPr lang="en-GB" sz="1100" b="0" dirty="0">
-                <a:solidFill>
-                  <a:schemeClr val="tx1"/>
-                </a:solidFill>
-              </a:rPr>
-              <a:t>, </a:t>
-            </a:r>
-            <a:r>
-              <a:rPr lang="en-GB" sz="1100" b="0" dirty="0">
-                <a:solidFill>
-                  <a:schemeClr val="tx1">
-                    <a:lumMod val="50000"/>
-                    <a:lumOff val="50000"/>
-                  </a:schemeClr>
-                </a:solidFill>
-              </a:rPr>
-              <a:t>value</a:t>
-            </a:r>
-            <a:r>
-              <a:rPr lang="en-GB" sz="1100" b="0" dirty="0">
-                <a:solidFill>
-                  <a:schemeClr val="tx1"/>
-                </a:solidFill>
-              </a:rPr>
-              <a:t>), .</a:t>
+              <a:t>),</a:t>
+            </a:r>
+          </a:p>
+          <a:p>
+            <a:pPr>
+              <a:tabLst>
+                <a:tab pos="55563" algn="l"/>
+                <a:tab pos="2228850" algn="l"/>
+                <a:tab pos="2859088" algn="l"/>
+              </a:tabLst>
+            </a:pPr>
+            <a:r>
+              <a:rPr lang="en-GB" sz="1100" b="0" dirty="0">
+                <a:solidFill>
+                  <a:schemeClr val="tx1"/>
+                </a:solidFill>
+              </a:rPr>
+              <a:t>	.</a:t>
             </a:r>
             <a:r>
               <a:rPr lang="en-GB" sz="1100" dirty="0">
@@ -9334,8 +9368,8 @@
         </p:nvSpPr>
         <p:spPr>
           <a:xfrm>
-            <a:off x="2507486" y="533399"/>
-            <a:ext cx="2744218" cy="2590801"/>
+            <a:off x="2507486" y="533400"/>
+            <a:ext cx="2744218" cy="2209800"/>
           </a:xfrm>
           <a:prstGeom prst="rect">
             <a:avLst/>
@@ -11559,8 +11593,8 @@
         </p:nvSpPr>
         <p:spPr>
           <a:xfrm>
-            <a:off x="2513584" y="3212740"/>
-            <a:ext cx="2738120" cy="2819399"/>
+            <a:off x="2513584" y="2844951"/>
+            <a:ext cx="2738120" cy="2870050"/>
           </a:xfrm>
           <a:prstGeom prst="rect">
             <a:avLst/>
@@ -19623,8 +19657,8 @@
         </p:nvSpPr>
         <p:spPr>
           <a:xfrm>
-            <a:off x="76203" y="5645915"/>
-            <a:ext cx="9753589" cy="1129790"/>
+            <a:off x="2743199" y="5645915"/>
+            <a:ext cx="7086593" cy="1129790"/>
           </a:xfrm>
           <a:prstGeom prst="rect">
             <a:avLst/>
@@ -21704,6 +21738,314 @@
           </a:fontRef>
         </p:style>
       </p:cxnSp>
+      <p:sp>
+        <p:nvSpPr>
+          <p:cNvPr id="24" name="TextBox 23">
+            <a:extLst>
+              <a:ext uri="{FF2B5EF4-FFF2-40B4-BE49-F238E27FC236}">
+                <a16:creationId xmlns:a16="http://schemas.microsoft.com/office/drawing/2014/main" id="{F44A3C48-02E3-49BE-A77F-ACC458946B1B}"/>
+              </a:ext>
+            </a:extLst>
+          </p:cNvPr>
+          <p:cNvSpPr txBox="1"/>
+          <p:nvPr/>
+        </p:nvSpPr>
+        <p:spPr>
+          <a:xfrm>
+            <a:off x="76203" y="5645915"/>
+            <a:ext cx="2590795" cy="1118283"/>
+          </a:xfrm>
+          <a:prstGeom prst="rect">
+            <a:avLst/>
+          </a:prstGeom>
+          <a:solidFill>
+            <a:schemeClr val="bg1"/>
+          </a:solidFill>
+          <a:ln w="3175">
+            <a:noFill/>
+          </a:ln>
+        </p:spPr>
+        <p:style>
+          <a:lnRef idx="2">
+            <a:schemeClr val="accent1">
+              <a:shade val="50000"/>
+            </a:schemeClr>
+          </a:lnRef>
+          <a:fillRef idx="1">
+            <a:schemeClr val="accent1"/>
+          </a:fillRef>
+          <a:effectRef idx="0">
+            <a:schemeClr val="accent1"/>
+          </a:effectRef>
+          <a:fontRef idx="minor">
+            <a:schemeClr val="lt1"/>
+          </a:fontRef>
+        </p:style>
+        <p:txBody>
+          <a:bodyPr rot="0" spcFirstLastPara="0" vertOverflow="overflow" horzOverflow="overflow" vert="horz" wrap="square" lIns="91440" tIns="45720" rIns="0" bIns="45720" numCol="1" spcCol="0" rtlCol="0" fromWordArt="0" anchor="t" anchorCtr="0" forceAA="0" compatLnSpc="1">
+            <a:prstTxWarp prst="textNoShape">
+              <a:avLst/>
+            </a:prstTxWarp>
+            <a:noAutofit/>
+          </a:bodyPr>
+          <a:lstStyle>
+            <a:defPPr>
+              <a:defRPr lang="en-US"/>
+            </a:defPPr>
+            <a:lvl1pPr>
+              <a:tabLst>
+                <a:tab pos="171450" algn="l"/>
+              </a:tabLst>
+              <a:defRPr sz="1000" b="1">
+                <a:solidFill>
+                  <a:schemeClr val="accent1"/>
+                </a:solidFill>
+                <a:latin typeface="Agency FB" panose="020B0503020202020204" pitchFamily="34" charset="0"/>
+              </a:defRPr>
+            </a:lvl1pPr>
+            <a:lvl2pPr>
+              <a:defRPr>
+                <a:solidFill>
+                  <a:schemeClr val="lt1"/>
+                </a:solidFill>
+              </a:defRPr>
+            </a:lvl2pPr>
+            <a:lvl3pPr>
+              <a:defRPr>
+                <a:solidFill>
+                  <a:schemeClr val="lt1"/>
+                </a:solidFill>
+              </a:defRPr>
+            </a:lvl3pPr>
+            <a:lvl4pPr>
+              <a:defRPr>
+                <a:solidFill>
+                  <a:schemeClr val="lt1"/>
+                </a:solidFill>
+              </a:defRPr>
+            </a:lvl4pPr>
+            <a:lvl5pPr>
+              <a:defRPr>
+                <a:solidFill>
+                  <a:schemeClr val="lt1"/>
+                </a:solidFill>
+              </a:defRPr>
+            </a:lvl5pPr>
+            <a:lvl6pPr>
+              <a:defRPr>
+                <a:solidFill>
+                  <a:schemeClr val="lt1"/>
+                </a:solidFill>
+              </a:defRPr>
+            </a:lvl6pPr>
+            <a:lvl7pPr>
+              <a:defRPr>
+                <a:solidFill>
+                  <a:schemeClr val="lt1"/>
+                </a:solidFill>
+              </a:defRPr>
+            </a:lvl7pPr>
+            <a:lvl8pPr>
+              <a:defRPr>
+                <a:solidFill>
+                  <a:schemeClr val="lt1"/>
+                </a:solidFill>
+              </a:defRPr>
+            </a:lvl8pPr>
+            <a:lvl9pPr>
+              <a:defRPr>
+                <a:solidFill>
+                  <a:schemeClr val="lt1"/>
+                </a:solidFill>
+              </a:defRPr>
+            </a:lvl9pPr>
+          </a:lstStyle>
+          <a:p>
+            <a:pPr>
+              <a:tabLst>
+                <a:tab pos="171450" algn="l"/>
+                <a:tab pos="2286000" algn="l"/>
+                <a:tab pos="2859088" algn="l"/>
+              </a:tabLst>
+            </a:pPr>
+            <a:r>
+              <a:rPr lang="en-GB" sz="1400" u="sng" dirty="0">
+                <a:solidFill>
+                  <a:schemeClr val="tx1"/>
+                </a:solidFill>
+              </a:rPr>
+              <a:t>LMS	 </a:t>
+            </a:r>
+          </a:p>
+          <a:p>
+            <a:pPr>
+              <a:tabLst>
+                <a:tab pos="171450" algn="l"/>
+                <a:tab pos="2228850" algn="l"/>
+                <a:tab pos="2859088" algn="l"/>
+              </a:tabLst>
+            </a:pPr>
+            <a:r>
+              <a:rPr lang="en-GB" sz="1100" b="0" dirty="0">
+                <a:solidFill>
+                  <a:schemeClr val="tx1"/>
+                </a:solidFill>
+              </a:rPr>
+              <a:t>&lt;</a:t>
+            </a:r>
+            <a:r>
+              <a:rPr lang="en-US" sz="1100" dirty="0" err="1">
+                <a:solidFill>
+                  <a:schemeClr val="tx1"/>
+                </a:solidFill>
+              </a:rPr>
+              <a:t>scorm</a:t>
+            </a:r>
+            <a:r>
+              <a:rPr lang="en-GB" sz="1100" b="0" dirty="0">
+                <a:solidFill>
+                  <a:schemeClr val="tx1"/>
+                </a:solidFill>
+              </a:rPr>
+              <a:t>&gt;</a:t>
+            </a:r>
+            <a:r>
+              <a:rPr lang="en-GB" sz="1100" b="0" dirty="0">
+                <a:solidFill>
+                  <a:schemeClr val="tx1">
+                    <a:lumMod val="50000"/>
+                    <a:lumOff val="50000"/>
+                  </a:schemeClr>
+                </a:solidFill>
+              </a:rPr>
+              <a:t>name</a:t>
+            </a:r>
+            <a:r>
+              <a:rPr lang="en-GB" sz="1100" b="0" dirty="0">
+                <a:solidFill>
+                  <a:schemeClr val="tx1"/>
+                </a:solidFill>
+              </a:rPr>
+              <a:t>&lt;/</a:t>
+            </a:r>
+            <a:r>
+              <a:rPr lang="en-US" sz="1100" dirty="0" err="1">
+                <a:solidFill>
+                  <a:schemeClr val="tx1"/>
+                </a:solidFill>
+              </a:rPr>
+              <a:t>scorm</a:t>
+            </a:r>
+            <a:r>
+              <a:rPr lang="en-GB" sz="1100" b="0" dirty="0">
+                <a:solidFill>
+                  <a:schemeClr val="tx1"/>
+                </a:solidFill>
+              </a:rPr>
+              <a:t>&gt;</a:t>
+            </a:r>
+          </a:p>
+          <a:p>
+            <a:pPr algn="r">
+              <a:tabLst>
+                <a:tab pos="171450" algn="l"/>
+                <a:tab pos="2228850" algn="l"/>
+                <a:tab pos="2859088" algn="l"/>
+              </a:tabLst>
+            </a:pPr>
+            <a:r>
+              <a:rPr lang="en-GB" sz="1100" b="0" dirty="0" err="1">
+                <a:solidFill>
+                  <a:schemeClr val="tx1">
+                    <a:lumMod val="50000"/>
+                    <a:lumOff val="50000"/>
+                  </a:schemeClr>
+                </a:solidFill>
+              </a:rPr>
+              <a:t>studentId</a:t>
+            </a:r>
+            <a:r>
+              <a:rPr lang="en-US" sz="1100" b="0" dirty="0">
+                <a:solidFill>
+                  <a:schemeClr val="tx1"/>
+                </a:solidFill>
+              </a:rPr>
+              <a:t>, </a:t>
+            </a:r>
+            <a:r>
+              <a:rPr lang="en-GB" sz="1100" b="0" dirty="0" err="1">
+                <a:solidFill>
+                  <a:schemeClr val="tx1">
+                    <a:lumMod val="50000"/>
+                    <a:lumOff val="50000"/>
+                  </a:schemeClr>
+                </a:solidFill>
+              </a:rPr>
+              <a:t>studentName</a:t>
+            </a:r>
+            <a:r>
+              <a:rPr lang="en-US" sz="1100" b="0" dirty="0">
+                <a:solidFill>
+                  <a:schemeClr val="tx1"/>
+                </a:solidFill>
+              </a:rPr>
+              <a:t>, </a:t>
+            </a:r>
+            <a:r>
+              <a:rPr lang="en-GB" sz="1100" b="0" dirty="0">
+                <a:solidFill>
+                  <a:schemeClr val="tx1">
+                    <a:lumMod val="50000"/>
+                    <a:lumOff val="50000"/>
+                  </a:schemeClr>
+                </a:solidFill>
+              </a:rPr>
+              <a:t>score, </a:t>
+            </a:r>
+            <a:r>
+              <a:rPr lang="en-GB" sz="1100" b="0" dirty="0" err="1">
+                <a:solidFill>
+                  <a:schemeClr val="tx1">
+                    <a:lumMod val="50000"/>
+                    <a:lumOff val="50000"/>
+                  </a:schemeClr>
+                </a:solidFill>
+              </a:rPr>
+              <a:t>cmi.core</a:t>
+            </a:r>
+            <a:r>
+              <a:rPr lang="en-GB" sz="1100" b="0">
+                <a:solidFill>
+                  <a:schemeClr val="tx1">
+                    <a:lumMod val="50000"/>
+                    <a:lumOff val="50000"/>
+                  </a:schemeClr>
+                </a:solidFill>
+              </a:rPr>
+              <a:t>….</a:t>
+            </a:r>
+            <a:endParaRPr lang="en-GB" sz="1100" b="0" dirty="0">
+              <a:solidFill>
+                <a:schemeClr val="tx1"/>
+              </a:solidFill>
+            </a:endParaRPr>
+          </a:p>
+          <a:p>
+            <a:pPr>
+              <a:tabLst>
+                <a:tab pos="171450" algn="l"/>
+                <a:tab pos="2228850" algn="l"/>
+                <a:tab pos="2859088" algn="l"/>
+              </a:tabLst>
+            </a:pPr>
+            <a:endParaRPr lang="en-GB" sz="1100" b="0" dirty="0">
+              <a:solidFill>
+                <a:schemeClr val="tx1"/>
+              </a:solidFill>
+            </a:endParaRPr>
+          </a:p>
+        </p:txBody>
+      </p:sp>
     </p:spTree>
     <p:extLst>
       <p:ext uri="{BB962C8B-B14F-4D97-AF65-F5344CB8AC3E}">

</xml_diff>

<commit_message>
Documentation and examples of `focusOn`
</commit_message>
<xml_diff>
--- a/docs/cheat-sheet.pptx
+++ b/docs/cheat-sheet.pptx
@@ -255,7 +255,7 @@
           <a:p>
             <a:fld id="{4346FDB3-09F2-4348-8F47-4013D9DCE7EC}" type="datetimeFigureOut">
               <a:rPr lang="bg-BG" smtClean="0"/>
-              <a:t>15.11.2022 г.</a:t>
+              <a:t>10.12.2022 г.</a:t>
             </a:fld>
             <a:endParaRPr lang="bg-BG"/>
           </a:p>
@@ -425,7 +425,7 @@
           <a:p>
             <a:fld id="{4346FDB3-09F2-4348-8F47-4013D9DCE7EC}" type="datetimeFigureOut">
               <a:rPr lang="bg-BG" smtClean="0"/>
-              <a:t>15.11.2022 г.</a:t>
+              <a:t>10.12.2022 г.</a:t>
             </a:fld>
             <a:endParaRPr lang="bg-BG"/>
           </a:p>
@@ -605,7 +605,7 @@
           <a:p>
             <a:fld id="{4346FDB3-09F2-4348-8F47-4013D9DCE7EC}" type="datetimeFigureOut">
               <a:rPr lang="bg-BG" smtClean="0"/>
-              <a:t>15.11.2022 г.</a:t>
+              <a:t>10.12.2022 г.</a:t>
             </a:fld>
             <a:endParaRPr lang="bg-BG"/>
           </a:p>
@@ -775,7 +775,7 @@
           <a:p>
             <a:fld id="{4346FDB3-09F2-4348-8F47-4013D9DCE7EC}" type="datetimeFigureOut">
               <a:rPr lang="bg-BG" smtClean="0"/>
-              <a:t>15.11.2022 г.</a:t>
+              <a:t>10.12.2022 г.</a:t>
             </a:fld>
             <a:endParaRPr lang="bg-BG"/>
           </a:p>
@@ -1019,7 +1019,7 @@
           <a:p>
             <a:fld id="{4346FDB3-09F2-4348-8F47-4013D9DCE7EC}" type="datetimeFigureOut">
               <a:rPr lang="bg-BG" smtClean="0"/>
-              <a:t>15.11.2022 г.</a:t>
+              <a:t>10.12.2022 г.</a:t>
             </a:fld>
             <a:endParaRPr lang="bg-BG"/>
           </a:p>
@@ -1251,7 +1251,7 @@
           <a:p>
             <a:fld id="{4346FDB3-09F2-4348-8F47-4013D9DCE7EC}" type="datetimeFigureOut">
               <a:rPr lang="bg-BG" smtClean="0"/>
-              <a:t>15.11.2022 г.</a:t>
+              <a:t>10.12.2022 г.</a:t>
             </a:fld>
             <a:endParaRPr lang="bg-BG"/>
           </a:p>
@@ -1618,7 +1618,7 @@
           <a:p>
             <a:fld id="{4346FDB3-09F2-4348-8F47-4013D9DCE7EC}" type="datetimeFigureOut">
               <a:rPr lang="bg-BG" smtClean="0"/>
-              <a:t>15.11.2022 г.</a:t>
+              <a:t>10.12.2022 г.</a:t>
             </a:fld>
             <a:endParaRPr lang="bg-BG"/>
           </a:p>
@@ -1736,7 +1736,7 @@
           <a:p>
             <a:fld id="{4346FDB3-09F2-4348-8F47-4013D9DCE7EC}" type="datetimeFigureOut">
               <a:rPr lang="bg-BG" smtClean="0"/>
-              <a:t>15.11.2022 г.</a:t>
+              <a:t>10.12.2022 г.</a:t>
             </a:fld>
             <a:endParaRPr lang="bg-BG"/>
           </a:p>
@@ -1831,7 +1831,7 @@
           <a:p>
             <a:fld id="{4346FDB3-09F2-4348-8F47-4013D9DCE7EC}" type="datetimeFigureOut">
               <a:rPr lang="bg-BG" smtClean="0"/>
-              <a:t>15.11.2022 г.</a:t>
+              <a:t>10.12.2022 г.</a:t>
             </a:fld>
             <a:endParaRPr lang="bg-BG"/>
           </a:p>
@@ -2108,7 +2108,7 @@
           <a:p>
             <a:fld id="{4346FDB3-09F2-4348-8F47-4013D9DCE7EC}" type="datetimeFigureOut">
               <a:rPr lang="bg-BG" smtClean="0"/>
-              <a:t>15.11.2022 г.</a:t>
+              <a:t>10.12.2022 г.</a:t>
             </a:fld>
             <a:endParaRPr lang="bg-BG"/>
           </a:p>
@@ -2365,7 +2365,7 @@
           <a:p>
             <a:fld id="{4346FDB3-09F2-4348-8F47-4013D9DCE7EC}" type="datetimeFigureOut">
               <a:rPr lang="bg-BG" smtClean="0"/>
-              <a:t>15.11.2022 г.</a:t>
+              <a:t>10.12.2022 г.</a:t>
             </a:fld>
             <a:endParaRPr lang="bg-BG"/>
           </a:p>
@@ -2578,7 +2578,7 @@
           <a:p>
             <a:fld id="{4346FDB3-09F2-4348-8F47-4013D9DCE7EC}" type="datetimeFigureOut">
               <a:rPr lang="bg-BG" smtClean="0"/>
-              <a:t>15.11.2022 г.</a:t>
+              <a:t>10.12.2022 г.</a:t>
             </a:fld>
             <a:endParaRPr lang="bg-BG"/>
           </a:p>
@@ -6768,7 +6768,241 @@
                   </a:schemeClr>
                 </a:solidFill>
               </a:rPr>
-              <a:t>value, min</a:t>
+              <a:t>value, min, max</a:t>
+            </a:r>
+            <a:r>
+              <a:rPr lang="fr-FR" sz="1100" b="0" dirty="0">
+                <a:solidFill>
+                  <a:schemeClr val="tx1"/>
+                </a:solidFill>
+              </a:rPr>
+              <a:t>)</a:t>
+            </a:r>
+          </a:p>
+          <a:p>
+            <a:r>
+              <a:rPr lang="fr-FR" sz="1100" dirty="0" err="1">
+                <a:solidFill>
+                  <a:schemeClr val="tx1"/>
+                </a:solidFill>
+              </a:rPr>
+              <a:t>random</a:t>
+            </a:r>
+            <a:r>
+              <a:rPr lang="fr-FR" sz="1100" b="0" dirty="0">
+                <a:solidFill>
+                  <a:schemeClr val="tx1"/>
+                </a:solidFill>
+              </a:rPr>
+              <a:t> (</a:t>
+            </a:r>
+            <a:r>
+              <a:rPr lang="fr-FR" sz="1100" b="0" dirty="0" err="1">
+                <a:solidFill>
+                  <a:schemeClr val="tx1">
+                    <a:lumMod val="50000"/>
+                    <a:lumOff val="50000"/>
+                  </a:schemeClr>
+                </a:solidFill>
+              </a:rPr>
+              <a:t>from</a:t>
+            </a:r>
+            <a:r>
+              <a:rPr lang="fr-FR" sz="1100" b="0" dirty="0">
+                <a:solidFill>
+                  <a:schemeClr val="tx1"/>
+                </a:solidFill>
+              </a:rPr>
+              <a:t>, </a:t>
+            </a:r>
+            <a:r>
+              <a:rPr lang="fr-FR" sz="1100" b="0" dirty="0">
+                <a:solidFill>
+                  <a:schemeClr val="tx1">
+                    <a:lumMod val="50000"/>
+                    <a:lumOff val="50000"/>
+                  </a:schemeClr>
+                </a:solidFill>
+              </a:rPr>
+              <a:t>to</a:t>
+            </a:r>
+            <a:r>
+              <a:rPr lang="fr-FR" sz="1100" b="0" dirty="0">
+                <a:solidFill>
+                  <a:schemeClr val="tx1"/>
+                </a:solidFill>
+              </a:rPr>
+              <a:t>)</a:t>
+            </a:r>
+          </a:p>
+          <a:p>
+            <a:r>
+              <a:rPr lang="fr-FR" sz="1100" dirty="0" err="1">
+                <a:solidFill>
+                  <a:schemeClr val="tx1"/>
+                </a:solidFill>
+              </a:rPr>
+              <a:t>random</a:t>
+            </a:r>
+            <a:r>
+              <a:rPr lang="fr-FR" sz="1100" b="0" dirty="0">
+                <a:solidFill>
+                  <a:schemeClr val="tx1"/>
+                </a:solidFill>
+              </a:rPr>
+              <a:t> ([</a:t>
+            </a:r>
+            <a:r>
+              <a:rPr lang="fr-FR" sz="1100" b="0" dirty="0">
+                <a:solidFill>
+                  <a:schemeClr val="tx1">
+                    <a:lumMod val="50000"/>
+                    <a:lumOff val="50000"/>
+                  </a:schemeClr>
+                </a:solidFill>
+              </a:rPr>
+              <a:t>value</a:t>
+            </a:r>
+            <a:r>
+              <a:rPr lang="fr-FR" sz="1100" b="0" dirty="0">
+                <a:solidFill>
+                  <a:schemeClr val="tx1"/>
+                </a:solidFill>
+              </a:rPr>
+              <a:t>,</a:t>
+            </a:r>
+            <a:r>
+              <a:rPr lang="fr-FR" sz="1100" b="0" dirty="0">
+                <a:solidFill>
+                  <a:schemeClr val="tx1">
+                    <a:lumMod val="50000"/>
+                    <a:lumOff val="50000"/>
+                  </a:schemeClr>
+                </a:solidFill>
+              </a:rPr>
+              <a:t>…</a:t>
+            </a:r>
+            <a:r>
+              <a:rPr lang="fr-FR" sz="1100" b="0" dirty="0">
+                <a:solidFill>
+                  <a:schemeClr val="tx1"/>
+                </a:solidFill>
+              </a:rPr>
+              <a:t>])</a:t>
+            </a:r>
+          </a:p>
+          <a:p>
+            <a:r>
+              <a:rPr lang="fr-FR" sz="1100" dirty="0" err="1">
+                <a:solidFill>
+                  <a:schemeClr val="tx1"/>
+                </a:solidFill>
+              </a:rPr>
+              <a:t>randomIn</a:t>
+            </a:r>
+            <a:r>
+              <a:rPr lang="fr-FR" sz="1100" b="0" dirty="0">
+                <a:solidFill>
+                  <a:schemeClr val="tx1"/>
+                </a:solidFill>
+              </a:rPr>
+              <a:t> (</a:t>
+            </a:r>
+            <a:r>
+              <a:rPr lang="fr-FR" sz="1100" b="0" dirty="0" err="1">
+                <a:solidFill>
+                  <a:schemeClr val="tx1">
+                    <a:lumMod val="50000"/>
+                    <a:lumOff val="50000"/>
+                  </a:schemeClr>
+                </a:solidFill>
+              </a:rPr>
+              <a:t>object</a:t>
+            </a:r>
+            <a:r>
+              <a:rPr lang="fr-FR" sz="1100" b="0" dirty="0">
+                <a:solidFill>
+                  <a:schemeClr val="tx1"/>
+                </a:solidFill>
+              </a:rPr>
+              <a:t>)</a:t>
+            </a:r>
+          </a:p>
+          <a:p>
+            <a:r>
+              <a:rPr lang="fr-FR" sz="1100" dirty="0" err="1">
+                <a:solidFill>
+                  <a:schemeClr val="tx1"/>
+                </a:solidFill>
+              </a:rPr>
+              <a:t>randomOn</a:t>
+            </a:r>
+            <a:r>
+              <a:rPr lang="fr-FR" sz="1100" b="0" dirty="0">
+                <a:solidFill>
+                  <a:schemeClr val="tx1"/>
+                </a:solidFill>
+              </a:rPr>
+              <a:t> (</a:t>
+            </a:r>
+            <a:r>
+              <a:rPr lang="fr-FR" sz="1100" b="0" dirty="0" err="1">
+                <a:solidFill>
+                  <a:schemeClr val="tx1">
+                    <a:lumMod val="50000"/>
+                    <a:lumOff val="50000"/>
+                  </a:schemeClr>
+                </a:solidFill>
+              </a:rPr>
+              <a:t>object</a:t>
+            </a:r>
+            <a:r>
+              <a:rPr lang="fr-FR" sz="1100" b="0" dirty="0">
+                <a:solidFill>
+                  <a:schemeClr val="tx1"/>
+                </a:solidFill>
+              </a:rPr>
+              <a:t>)</a:t>
+            </a:r>
+          </a:p>
+          <a:p>
+            <a:r>
+              <a:rPr lang="fr-FR" sz="1100" dirty="0" err="1">
+                <a:solidFill>
+                  <a:schemeClr val="tx1"/>
+                </a:solidFill>
+              </a:rPr>
+              <a:t>focusOn</a:t>
+            </a:r>
+            <a:r>
+              <a:rPr lang="fr-FR" sz="1100" b="0" dirty="0">
+                <a:solidFill>
+                  <a:schemeClr val="tx1"/>
+                </a:solidFill>
+              </a:rPr>
+              <a:t> (</a:t>
+            </a:r>
+            <a:r>
+              <a:rPr lang="fr-FR" sz="1100" b="0" dirty="0" err="1">
+                <a:solidFill>
+                  <a:schemeClr val="tx1">
+                    <a:lumMod val="50000"/>
+                    <a:lumOff val="50000"/>
+                  </a:schemeClr>
+                </a:solidFill>
+              </a:rPr>
+              <a:t>object</a:t>
+            </a:r>
+            <a:r>
+              <a:rPr lang="fr-FR" sz="1100" b="0" dirty="0">
+                <a:solidFill>
+                  <a:schemeClr val="tx1">
+                    <a:lumMod val="50000"/>
+                    <a:lumOff val="50000"/>
+                  </a:schemeClr>
+                </a:solidFill>
+              </a:rPr>
+              <a:t>, spin</a:t>
             </a:r>
             <a:r>
               <a:rPr lang="fr-FR" sz="1100" b="0">
@@ -6779,7 +7013,7 @@
                   </a:schemeClr>
                 </a:solidFill>
               </a:rPr>
-              <a:t>, max</a:t>
+              <a:t>, axis</a:t>
             </a:r>
             <a:r>
               <a:rPr lang="fr-FR" sz="1100" b="0">
@@ -6794,192 +7028,6 @@
                 <a:schemeClr val="tx1"/>
               </a:solidFill>
             </a:endParaRPr>
-          </a:p>
-          <a:p>
-            <a:r>
-              <a:rPr lang="fr-FR" sz="1100" dirty="0" err="1">
-                <a:solidFill>
-                  <a:schemeClr val="tx1"/>
-                </a:solidFill>
-              </a:rPr>
-              <a:t>random</a:t>
-            </a:r>
-            <a:r>
-              <a:rPr lang="fr-FR" sz="1100" b="0" dirty="0">
-                <a:solidFill>
-                  <a:schemeClr val="tx1"/>
-                </a:solidFill>
-              </a:rPr>
-              <a:t> (</a:t>
-            </a:r>
-            <a:r>
-              <a:rPr lang="fr-FR" sz="1100" b="0" dirty="0" err="1">
-                <a:solidFill>
-                  <a:schemeClr val="tx1">
-                    <a:lumMod val="50000"/>
-                    <a:lumOff val="50000"/>
-                  </a:schemeClr>
-                </a:solidFill>
-              </a:rPr>
-              <a:t>from</a:t>
-            </a:r>
-            <a:r>
-              <a:rPr lang="fr-FR" sz="1100" b="0" dirty="0">
-                <a:solidFill>
-                  <a:schemeClr val="tx1"/>
-                </a:solidFill>
-              </a:rPr>
-              <a:t>, </a:t>
-            </a:r>
-            <a:r>
-              <a:rPr lang="fr-FR" sz="1100" b="0" dirty="0">
-                <a:solidFill>
-                  <a:schemeClr val="tx1">
-                    <a:lumMod val="50000"/>
-                    <a:lumOff val="50000"/>
-                  </a:schemeClr>
-                </a:solidFill>
-              </a:rPr>
-              <a:t>to</a:t>
-            </a:r>
-            <a:r>
-              <a:rPr lang="fr-FR" sz="1100" b="0" dirty="0">
-                <a:solidFill>
-                  <a:schemeClr val="tx1"/>
-                </a:solidFill>
-              </a:rPr>
-              <a:t>)</a:t>
-            </a:r>
-          </a:p>
-          <a:p>
-            <a:r>
-              <a:rPr lang="fr-FR" sz="1100" dirty="0" err="1">
-                <a:solidFill>
-                  <a:schemeClr val="tx1"/>
-                </a:solidFill>
-              </a:rPr>
-              <a:t>random</a:t>
-            </a:r>
-            <a:r>
-              <a:rPr lang="fr-FR" sz="1100" b="0" dirty="0">
-                <a:solidFill>
-                  <a:schemeClr val="tx1"/>
-                </a:solidFill>
-              </a:rPr>
-              <a:t> ([</a:t>
-            </a:r>
-            <a:r>
-              <a:rPr lang="fr-FR" sz="1100" b="0" dirty="0">
-                <a:solidFill>
-                  <a:schemeClr val="tx1">
-                    <a:lumMod val="50000"/>
-                    <a:lumOff val="50000"/>
-                  </a:schemeClr>
-                </a:solidFill>
-              </a:rPr>
-              <a:t>value</a:t>
-            </a:r>
-            <a:r>
-              <a:rPr lang="fr-FR" sz="1100" b="0" dirty="0">
-                <a:solidFill>
-                  <a:schemeClr val="tx1"/>
-                </a:solidFill>
-              </a:rPr>
-              <a:t>,</a:t>
-            </a:r>
-            <a:r>
-              <a:rPr lang="fr-FR" sz="1100" b="0" dirty="0">
-                <a:solidFill>
-                  <a:schemeClr val="tx1">
-                    <a:lumMod val="50000"/>
-                    <a:lumOff val="50000"/>
-                  </a:schemeClr>
-                </a:solidFill>
-              </a:rPr>
-              <a:t>…</a:t>
-            </a:r>
-            <a:r>
-              <a:rPr lang="fr-FR" sz="1100" b="0" dirty="0">
-                <a:solidFill>
-                  <a:schemeClr val="tx1"/>
-                </a:solidFill>
-              </a:rPr>
-              <a:t>])</a:t>
-            </a:r>
-          </a:p>
-          <a:p>
-            <a:r>
-              <a:rPr lang="fr-FR" sz="1100" dirty="0" err="1">
-                <a:solidFill>
-                  <a:schemeClr val="tx1"/>
-                </a:solidFill>
-              </a:rPr>
-              <a:t>randomIn</a:t>
-            </a:r>
-            <a:r>
-              <a:rPr lang="fr-FR" sz="1100" b="0" dirty="0">
-                <a:solidFill>
-                  <a:schemeClr val="tx1"/>
-                </a:solidFill>
-              </a:rPr>
-              <a:t> (</a:t>
-            </a:r>
-            <a:r>
-              <a:rPr lang="fr-FR" sz="1100" b="0" dirty="0" err="1">
-                <a:solidFill>
-                  <a:schemeClr val="tx1">
-                    <a:lumMod val="50000"/>
-                    <a:lumOff val="50000"/>
-                  </a:schemeClr>
-                </a:solidFill>
-              </a:rPr>
-              <a:t>object</a:t>
-            </a:r>
-            <a:r>
-              <a:rPr lang="fr-FR" sz="1100" b="0" dirty="0">
-                <a:solidFill>
-                  <a:schemeClr val="tx1"/>
-                </a:solidFill>
-              </a:rPr>
-              <a:t>)</a:t>
-            </a:r>
-          </a:p>
-          <a:p>
-            <a:r>
-              <a:rPr lang="fr-FR" sz="1100" dirty="0" err="1">
-                <a:solidFill>
-                  <a:schemeClr val="tx1"/>
-                </a:solidFill>
-              </a:rPr>
-              <a:t>randomOn</a:t>
-            </a:r>
-            <a:r>
-              <a:rPr lang="fr-FR" sz="1100" b="0" dirty="0">
-                <a:solidFill>
-                  <a:schemeClr val="tx1"/>
-                </a:solidFill>
-              </a:rPr>
-              <a:t> (</a:t>
-            </a:r>
-            <a:r>
-              <a:rPr lang="fr-FR" sz="1100" b="0" dirty="0" err="1">
-                <a:solidFill>
-                  <a:schemeClr val="tx1">
-                    <a:lumMod val="50000"/>
-                    <a:lumOff val="50000"/>
-                  </a:schemeClr>
-                </a:solidFill>
-              </a:rPr>
-              <a:t>object</a:t>
-            </a:r>
-            <a:r>
-              <a:rPr lang="fr-FR" sz="1100" b="0" dirty="0">
-                <a:solidFill>
-                  <a:schemeClr val="tx1"/>
-                </a:solidFill>
-              </a:rPr>
-              <a:t>)</a:t>
-            </a:r>
           </a:p>
           <a:p>
             <a:endParaRPr lang="fr-FR" sz="1100" b="0" dirty="0">

</xml_diff>

<commit_message>
Replaced focusOn with lookAt
</commit_message>
<xml_diff>
--- a/docs/cheat-sheet.pptx
+++ b/docs/cheat-sheet.pptx
@@ -255,7 +255,7 @@
           <a:p>
             <a:fld id="{4346FDB3-09F2-4348-8F47-4013D9DCE7EC}" type="datetimeFigureOut">
               <a:rPr lang="bg-BG" smtClean="0"/>
-              <a:t>10.12.2022 г.</a:t>
+              <a:t>13.2.2023 г.</a:t>
             </a:fld>
             <a:endParaRPr lang="bg-BG"/>
           </a:p>
@@ -425,7 +425,7 @@
           <a:p>
             <a:fld id="{4346FDB3-09F2-4348-8F47-4013D9DCE7EC}" type="datetimeFigureOut">
               <a:rPr lang="bg-BG" smtClean="0"/>
-              <a:t>10.12.2022 г.</a:t>
+              <a:t>13.2.2023 г.</a:t>
             </a:fld>
             <a:endParaRPr lang="bg-BG"/>
           </a:p>
@@ -605,7 +605,7 @@
           <a:p>
             <a:fld id="{4346FDB3-09F2-4348-8F47-4013D9DCE7EC}" type="datetimeFigureOut">
               <a:rPr lang="bg-BG" smtClean="0"/>
-              <a:t>10.12.2022 г.</a:t>
+              <a:t>13.2.2023 г.</a:t>
             </a:fld>
             <a:endParaRPr lang="bg-BG"/>
           </a:p>
@@ -775,7 +775,7 @@
           <a:p>
             <a:fld id="{4346FDB3-09F2-4348-8F47-4013D9DCE7EC}" type="datetimeFigureOut">
               <a:rPr lang="bg-BG" smtClean="0"/>
-              <a:t>10.12.2022 г.</a:t>
+              <a:t>13.2.2023 г.</a:t>
             </a:fld>
             <a:endParaRPr lang="bg-BG"/>
           </a:p>
@@ -1019,7 +1019,7 @@
           <a:p>
             <a:fld id="{4346FDB3-09F2-4348-8F47-4013D9DCE7EC}" type="datetimeFigureOut">
               <a:rPr lang="bg-BG" smtClean="0"/>
-              <a:t>10.12.2022 г.</a:t>
+              <a:t>13.2.2023 г.</a:t>
             </a:fld>
             <a:endParaRPr lang="bg-BG"/>
           </a:p>
@@ -1251,7 +1251,7 @@
           <a:p>
             <a:fld id="{4346FDB3-09F2-4348-8F47-4013D9DCE7EC}" type="datetimeFigureOut">
               <a:rPr lang="bg-BG" smtClean="0"/>
-              <a:t>10.12.2022 г.</a:t>
+              <a:t>13.2.2023 г.</a:t>
             </a:fld>
             <a:endParaRPr lang="bg-BG"/>
           </a:p>
@@ -1618,7 +1618,7 @@
           <a:p>
             <a:fld id="{4346FDB3-09F2-4348-8F47-4013D9DCE7EC}" type="datetimeFigureOut">
               <a:rPr lang="bg-BG" smtClean="0"/>
-              <a:t>10.12.2022 г.</a:t>
+              <a:t>13.2.2023 г.</a:t>
             </a:fld>
             <a:endParaRPr lang="bg-BG"/>
           </a:p>
@@ -1736,7 +1736,7 @@
           <a:p>
             <a:fld id="{4346FDB3-09F2-4348-8F47-4013D9DCE7EC}" type="datetimeFigureOut">
               <a:rPr lang="bg-BG" smtClean="0"/>
-              <a:t>10.12.2022 г.</a:t>
+              <a:t>13.2.2023 г.</a:t>
             </a:fld>
             <a:endParaRPr lang="bg-BG"/>
           </a:p>
@@ -1831,7 +1831,7 @@
           <a:p>
             <a:fld id="{4346FDB3-09F2-4348-8F47-4013D9DCE7EC}" type="datetimeFigureOut">
               <a:rPr lang="bg-BG" smtClean="0"/>
-              <a:t>10.12.2022 г.</a:t>
+              <a:t>13.2.2023 г.</a:t>
             </a:fld>
             <a:endParaRPr lang="bg-BG"/>
           </a:p>
@@ -2108,7 +2108,7 @@
           <a:p>
             <a:fld id="{4346FDB3-09F2-4348-8F47-4013D9DCE7EC}" type="datetimeFigureOut">
               <a:rPr lang="bg-BG" smtClean="0"/>
-              <a:t>10.12.2022 г.</a:t>
+              <a:t>13.2.2023 г.</a:t>
             </a:fld>
             <a:endParaRPr lang="bg-BG"/>
           </a:p>
@@ -2365,7 +2365,7 @@
           <a:p>
             <a:fld id="{4346FDB3-09F2-4348-8F47-4013D9DCE7EC}" type="datetimeFigureOut">
               <a:rPr lang="bg-BG" smtClean="0"/>
-              <a:t>10.12.2022 г.</a:t>
+              <a:t>13.2.2023 г.</a:t>
             </a:fld>
             <a:endParaRPr lang="bg-BG"/>
           </a:p>
@@ -2578,7 +2578,7 @@
           <a:p>
             <a:fld id="{4346FDB3-09F2-4348-8F47-4013D9DCE7EC}" type="datetimeFigureOut">
               <a:rPr lang="bg-BG" smtClean="0"/>
-              <a:t>10.12.2022 г.</a:t>
+              <a:t>13.2.2023 г.</a:t>
             </a:fld>
             <a:endParaRPr lang="bg-BG"/>
           </a:p>
@@ -6972,7 +6972,7 @@
                   <a:schemeClr val="tx1"/>
                 </a:solidFill>
               </a:rPr>
-              <a:t>focusOn</a:t>
+              <a:t>lookAt</a:t>
             </a:r>
             <a:r>
               <a:rPr lang="fr-FR" sz="1100" b="0" dirty="0">
@@ -7002,32 +7002,16 @@
                   </a:schemeClr>
                 </a:solidFill>
               </a:rPr>
-              <a:t>, spin</a:t>
-            </a:r>
-            <a:r>
-              <a:rPr lang="fr-FR" sz="1100" b="0">
-                <a:solidFill>
-                  <a:schemeClr val="tx1">
-                    <a:lumMod val="50000"/>
-                    <a:lumOff val="50000"/>
-                  </a:schemeClr>
-                </a:solidFill>
-              </a:rPr>
-              <a:t>, axis</a:t>
-            </a:r>
-            <a:r>
-              <a:rPr lang="fr-FR" sz="1100" b="0">
+              <a:t>, spin, axis</a:t>
+            </a:r>
+            <a:r>
+              <a:rPr lang="fr-FR" sz="1100" b="0" dirty="0">
                 <a:solidFill>
                   <a:schemeClr val="tx1"/>
                 </a:solidFill>
               </a:rPr>
               <a:t>)</a:t>
             </a:r>
-            <a:endParaRPr lang="fr-FR" sz="1100" b="0" dirty="0">
-              <a:solidFill>
-                <a:schemeClr val="tx1"/>
-              </a:solidFill>
-            </a:endParaRPr>
           </a:p>
           <a:p>
             <a:endParaRPr lang="fr-FR" sz="1100" b="0" dirty="0">

</xml_diff>